<commit_message>
Minor fixes to text
</commit_message>
<xml_diff>
--- a/report/presentation_without_macros.pptx
+++ b/report/presentation_without_macros.pptx
@@ -5,10 +5,10 @@
     <p:sldMasterId id="2147483648" r:id="rId4"/>
   </p:sldMasterIdLst>
   <p:notesMasterIdLst>
-    <p:notesMasterId r:id="rId19"/>
+    <p:notesMasterId r:id="rId18"/>
   </p:notesMasterIdLst>
   <p:handoutMasterIdLst>
-    <p:handoutMasterId r:id="rId20"/>
+    <p:handoutMasterId r:id="rId19"/>
   </p:handoutMasterIdLst>
   <p:sldIdLst>
     <p:sldId id="278" r:id="rId5"/>
@@ -18,13 +18,12 @@
     <p:sldId id="313" r:id="rId9"/>
     <p:sldId id="302" r:id="rId10"/>
     <p:sldId id="314" r:id="rId11"/>
-    <p:sldId id="315" r:id="rId12"/>
-    <p:sldId id="316" r:id="rId13"/>
-    <p:sldId id="306" r:id="rId14"/>
-    <p:sldId id="307" r:id="rId15"/>
-    <p:sldId id="308" r:id="rId16"/>
-    <p:sldId id="317" r:id="rId17"/>
-    <p:sldId id="309" r:id="rId18"/>
+    <p:sldId id="316" r:id="rId12"/>
+    <p:sldId id="306" r:id="rId13"/>
+    <p:sldId id="307" r:id="rId14"/>
+    <p:sldId id="308" r:id="rId15"/>
+    <p:sldId id="317" r:id="rId16"/>
+    <p:sldId id="309" r:id="rId17"/>
   </p:sldIdLst>
   <p:sldSz cx="12192000" cy="6858000"/>
   <p:notesSz cx="6858000" cy="9144000"/>
@@ -797,131 +796,6 @@
         <p:cNvPr id="1" name="">
           <a:extLst>
             <a:ext uri="{FF2B5EF4-FFF2-40B4-BE49-F238E27FC236}">
-              <a16:creationId xmlns:a16="http://schemas.microsoft.com/office/drawing/2014/main" id="{E3C3BA0F-5D2A-638D-61CF-5BA6EB3F06B8}"/>
-            </a:ext>
-          </a:extLst>
-        </p:cNvPr>
-        <p:cNvGrpSpPr/>
-        <p:nvPr/>
-      </p:nvGrpSpPr>
-      <p:grpSpPr>
-        <a:xfrm>
-          <a:off x="0" y="0"/>
-          <a:ext cx="0" cy="0"/>
-          <a:chOff x="0" y="0"/>
-          <a:chExt cx="0" cy="0"/>
-        </a:xfrm>
-      </p:grpSpPr>
-      <p:sp>
-        <p:nvSpPr>
-          <p:cNvPr id="2" name="Folienbildplatzhalter 1">
-            <a:extLst>
-              <a:ext uri="{FF2B5EF4-FFF2-40B4-BE49-F238E27FC236}">
-                <a16:creationId xmlns:a16="http://schemas.microsoft.com/office/drawing/2014/main" id="{937A1B87-E5AD-8D54-6AA7-5C77A023EDC4}"/>
-              </a:ext>
-            </a:extLst>
-          </p:cNvPr>
-          <p:cNvSpPr>
-            <a:spLocks noGrp="1" noRot="1" noChangeAspect="1"/>
-          </p:cNvSpPr>
-          <p:nvPr>
-            <p:ph type="sldImg"/>
-          </p:nvPr>
-        </p:nvSpPr>
-        <p:spPr/>
-      </p:sp>
-      <p:sp>
-        <p:nvSpPr>
-          <p:cNvPr id="3" name="Notizenplatzhalter 2">
-            <a:extLst>
-              <a:ext uri="{FF2B5EF4-FFF2-40B4-BE49-F238E27FC236}">
-                <a16:creationId xmlns:a16="http://schemas.microsoft.com/office/drawing/2014/main" id="{145905E5-EE54-1192-646F-4408E3088B6A}"/>
-              </a:ext>
-            </a:extLst>
-          </p:cNvPr>
-          <p:cNvSpPr>
-            <a:spLocks noGrp="1"/>
-          </p:cNvSpPr>
-          <p:nvPr>
-            <p:ph type="body" idx="1"/>
-          </p:nvPr>
-        </p:nvSpPr>
-        <p:spPr/>
-        <p:txBody>
-          <a:bodyPr rtlCol="0"/>
-          <a:lstStyle>
-            <a:defPPr>
-              <a:defRPr lang="de-DE"/>
-            </a:defPPr>
-          </a:lstStyle>
-          <a:p>
-            <a:pPr rtl="0"/>
-            <a:r>
-              <a:rPr lang="en-US" dirty="0"/>
-              <a:t>As you can also see, the quantized models are 90% smaller than the baseline model. So using GPTQ we were able to greatly reduce the model size without losing any performance.</a:t>
-            </a:r>
-          </a:p>
-          <a:p>
-            <a:pPr rtl="0"/>
-            <a:endParaRPr lang="de-DE" dirty="0"/>
-          </a:p>
-        </p:txBody>
-      </p:sp>
-      <p:sp>
-        <p:nvSpPr>
-          <p:cNvPr id="4" name="Foliennummernplatzhalter 3">
-            <a:extLst>
-              <a:ext uri="{FF2B5EF4-FFF2-40B4-BE49-F238E27FC236}">
-                <a16:creationId xmlns:a16="http://schemas.microsoft.com/office/drawing/2014/main" id="{B91F591C-EF7F-71C5-8B0D-495698AEB1A9}"/>
-              </a:ext>
-            </a:extLst>
-          </p:cNvPr>
-          <p:cNvSpPr>
-            <a:spLocks noGrp="1"/>
-          </p:cNvSpPr>
-          <p:nvPr>
-            <p:ph type="sldNum" sz="quarter" idx="5"/>
-          </p:nvPr>
-        </p:nvSpPr>
-        <p:spPr/>
-        <p:txBody>
-          <a:bodyPr rtlCol="0"/>
-          <a:lstStyle>
-            <a:defPPr>
-              <a:defRPr lang="de-DE"/>
-            </a:defPPr>
-          </a:lstStyle>
-          <a:p>
-            <a:pPr rtl="0"/>
-            <a:fld id="{22289C57-55D7-40A4-A101-E74FAC7A092B}" type="slidenum">
-              <a:rPr lang="de-DE" smtClean="0"/>
-              <a:t>10</a:t>
-            </a:fld>
-            <a:endParaRPr lang="de-DE" dirty="0"/>
-          </a:p>
-        </p:txBody>
-      </p:sp>
-    </p:spTree>
-    <p:extLst>
-      <p:ext uri="{BB962C8B-B14F-4D97-AF65-F5344CB8AC3E}">
-        <p14:creationId xmlns:p14="http://schemas.microsoft.com/office/powerpoint/2010/main" val="3333490565"/>
-      </p:ext>
-    </p:extLst>
-  </p:cSld>
-  <p:clrMapOvr>
-    <a:masterClrMapping/>
-  </p:clrMapOvr>
-</p:notes>
-</file>
-
-<file path=ppt/notesSlides/notesSlide11.xml><?xml version="1.0" encoding="utf-8"?>
-<p:notes xmlns:a="http://schemas.openxmlformats.org/drawingml/2006/main" xmlns:r="http://schemas.openxmlformats.org/officeDocument/2006/relationships" xmlns:p="http://schemas.openxmlformats.org/presentationml/2006/main">
-  <p:cSld>
-    <p:spTree>
-      <p:nvGrpSpPr>
-        <p:cNvPr id="1" name="">
-          <a:extLst>
-            <a:ext uri="{FF2B5EF4-FFF2-40B4-BE49-F238E27FC236}">
               <a16:creationId xmlns:a16="http://schemas.microsoft.com/office/drawing/2014/main" id="{5FE0DD98-EC67-5941-F66B-947543403A79}"/>
             </a:ext>
           </a:extLst>
@@ -1027,7 +901,7 @@
             <a:pPr rtl="0"/>
             <a:fld id="{22289C57-55D7-40A4-A101-E74FAC7A092B}" type="slidenum">
               <a:rPr lang="de-DE" smtClean="0"/>
-              <a:t>11</a:t>
+              <a:t>10</a:t>
             </a:fld>
             <a:endParaRPr lang="de-DE" dirty="0"/>
           </a:p>
@@ -1046,7 +920,7 @@
 </p:notes>
 </file>
 
-<file path=ppt/notesSlides/notesSlide12.xml><?xml version="1.0" encoding="utf-8"?>
+<file path=ppt/notesSlides/notesSlide11.xml><?xml version="1.0" encoding="utf-8"?>
 <p:notes xmlns:a="http://schemas.openxmlformats.org/drawingml/2006/main" xmlns:r="http://schemas.openxmlformats.org/officeDocument/2006/relationships" xmlns:p="http://schemas.openxmlformats.org/presentationml/2006/main">
   <p:cSld>
     <p:spTree>
@@ -1163,7 +1037,7 @@
             <a:pPr rtl="0"/>
             <a:fld id="{22289C57-55D7-40A4-A101-E74FAC7A092B}" type="slidenum">
               <a:rPr lang="de-DE" smtClean="0"/>
-              <a:t>12</a:t>
+              <a:t>11</a:t>
             </a:fld>
             <a:endParaRPr lang="de-DE" dirty="0"/>
           </a:p>
@@ -1182,7 +1056,7 @@
 </p:notes>
 </file>
 
-<file path=ppt/notesSlides/notesSlide13.xml><?xml version="1.0" encoding="utf-8"?>
+<file path=ppt/notesSlides/notesSlide12.xml><?xml version="1.0" encoding="utf-8"?>
 <p:notes xmlns:a="http://schemas.openxmlformats.org/drawingml/2006/main" xmlns:r="http://schemas.openxmlformats.org/officeDocument/2006/relationships" xmlns:p="http://schemas.openxmlformats.org/presentationml/2006/main">
   <p:cSld>
     <p:spTree>
@@ -1299,7 +1173,7 @@
             <a:pPr rtl="0"/>
             <a:fld id="{22289C57-55D7-40A4-A101-E74FAC7A092B}" type="slidenum">
               <a:rPr lang="de-DE" smtClean="0"/>
-              <a:t>13</a:t>
+              <a:t>12</a:t>
             </a:fld>
             <a:endParaRPr lang="de-DE" dirty="0"/>
           </a:p>
@@ -1318,7 +1192,7 @@
 </p:notes>
 </file>
 
-<file path=ppt/notesSlides/notesSlide14.xml><?xml version="1.0" encoding="utf-8"?>
+<file path=ppt/notesSlides/notesSlide13.xml><?xml version="1.0" encoding="utf-8"?>
 <p:notes xmlns:a="http://schemas.openxmlformats.org/drawingml/2006/main" xmlns:r="http://schemas.openxmlformats.org/officeDocument/2006/relationships" xmlns:p="http://schemas.openxmlformats.org/presentationml/2006/main">
   <p:cSld>
     <p:spTree>
@@ -1421,7 +1295,7 @@
             <a:pPr rtl="0"/>
             <a:fld id="{22289C57-55D7-40A4-A101-E74FAC7A092B}" type="slidenum">
               <a:rPr lang="de-DE" smtClean="0"/>
-              <a:t>14</a:t>
+              <a:t>13</a:t>
             </a:fld>
             <a:endParaRPr lang="de-DE" dirty="0"/>
           </a:p>
@@ -2259,124 +2133,6 @@
         <p:cNvPr id="1" name="">
           <a:extLst>
             <a:ext uri="{FF2B5EF4-FFF2-40B4-BE49-F238E27FC236}">
-              <a16:creationId xmlns:a16="http://schemas.microsoft.com/office/drawing/2014/main" id="{0B0CC2A9-3BFB-C76C-2184-0D71C66215BA}"/>
-            </a:ext>
-          </a:extLst>
-        </p:cNvPr>
-        <p:cNvGrpSpPr/>
-        <p:nvPr/>
-      </p:nvGrpSpPr>
-      <p:grpSpPr>
-        <a:xfrm>
-          <a:off x="0" y="0"/>
-          <a:ext cx="0" cy="0"/>
-          <a:chOff x="0" y="0"/>
-          <a:chExt cx="0" cy="0"/>
-        </a:xfrm>
-      </p:grpSpPr>
-      <p:sp>
-        <p:nvSpPr>
-          <p:cNvPr id="2" name="Folienbildplatzhalter 1">
-            <a:extLst>
-              <a:ext uri="{FF2B5EF4-FFF2-40B4-BE49-F238E27FC236}">
-                <a16:creationId xmlns:a16="http://schemas.microsoft.com/office/drawing/2014/main" id="{CD311131-970F-6A3F-2599-8D18BC5ED8B0}"/>
-              </a:ext>
-            </a:extLst>
-          </p:cNvPr>
-          <p:cNvSpPr>
-            <a:spLocks noGrp="1" noRot="1" noChangeAspect="1"/>
-          </p:cNvSpPr>
-          <p:nvPr>
-            <p:ph type="sldImg"/>
-          </p:nvPr>
-        </p:nvSpPr>
-        <p:spPr/>
-      </p:sp>
-      <p:sp>
-        <p:nvSpPr>
-          <p:cNvPr id="3" name="Notizenplatzhalter 2">
-            <a:extLst>
-              <a:ext uri="{FF2B5EF4-FFF2-40B4-BE49-F238E27FC236}">
-                <a16:creationId xmlns:a16="http://schemas.microsoft.com/office/drawing/2014/main" id="{C03244EB-4A76-5AC8-51FA-F04806B1BEA3}"/>
-              </a:ext>
-            </a:extLst>
-          </p:cNvPr>
-          <p:cNvSpPr>
-            <a:spLocks noGrp="1"/>
-          </p:cNvSpPr>
-          <p:nvPr>
-            <p:ph type="body" idx="1"/>
-          </p:nvPr>
-        </p:nvSpPr>
-        <p:spPr/>
-        <p:txBody>
-          <a:bodyPr rtlCol="0"/>
-          <a:lstStyle>
-            <a:defPPr>
-              <a:defRPr lang="de-DE"/>
-            </a:defPPr>
-          </a:lstStyle>
-          <a:p>
-            <a:pPr rtl="0"/>
-            <a:endParaRPr lang="de-DE" dirty="0"/>
-          </a:p>
-        </p:txBody>
-      </p:sp>
-      <p:sp>
-        <p:nvSpPr>
-          <p:cNvPr id="4" name="Foliennummernplatzhalter 3">
-            <a:extLst>
-              <a:ext uri="{FF2B5EF4-FFF2-40B4-BE49-F238E27FC236}">
-                <a16:creationId xmlns:a16="http://schemas.microsoft.com/office/drawing/2014/main" id="{D2496445-9AE9-F2E4-F596-8F879FABE2D2}"/>
-              </a:ext>
-            </a:extLst>
-          </p:cNvPr>
-          <p:cNvSpPr>
-            <a:spLocks noGrp="1"/>
-          </p:cNvSpPr>
-          <p:nvPr>
-            <p:ph type="sldNum" sz="quarter" idx="5"/>
-          </p:nvPr>
-        </p:nvSpPr>
-        <p:spPr/>
-        <p:txBody>
-          <a:bodyPr rtlCol="0"/>
-          <a:lstStyle>
-            <a:defPPr>
-              <a:defRPr lang="de-DE"/>
-            </a:defPPr>
-          </a:lstStyle>
-          <a:p>
-            <a:pPr rtl="0"/>
-            <a:fld id="{22289C57-55D7-40A4-A101-E74FAC7A092B}" type="slidenum">
-              <a:rPr lang="de-DE" smtClean="0"/>
-              <a:t>8</a:t>
-            </a:fld>
-            <a:endParaRPr lang="de-DE" dirty="0"/>
-          </a:p>
-        </p:txBody>
-      </p:sp>
-    </p:spTree>
-    <p:extLst>
-      <p:ext uri="{BB962C8B-B14F-4D97-AF65-F5344CB8AC3E}">
-        <p14:creationId xmlns:p14="http://schemas.microsoft.com/office/powerpoint/2010/main" val="2700016688"/>
-      </p:ext>
-    </p:extLst>
-  </p:cSld>
-  <p:clrMapOvr>
-    <a:masterClrMapping/>
-  </p:clrMapOvr>
-</p:notes>
-</file>
-
-<file path=ppt/notesSlides/notesSlide9.xml><?xml version="1.0" encoding="utf-8"?>
-<p:notes xmlns:a="http://schemas.openxmlformats.org/drawingml/2006/main" xmlns:r="http://schemas.openxmlformats.org/officeDocument/2006/relationships" xmlns:p="http://schemas.openxmlformats.org/presentationml/2006/main">
-  <p:cSld>
-    <p:spTree>
-      <p:nvGrpSpPr>
-        <p:cNvPr id="1" name="">
-          <a:extLst>
-            <a:ext uri="{FF2B5EF4-FFF2-40B4-BE49-F238E27FC236}">
               <a16:creationId xmlns:a16="http://schemas.microsoft.com/office/drawing/2014/main" id="{6160DD7E-C70B-C792-405C-9AF229F55DEE}"/>
             </a:ext>
           </a:extLst>
@@ -2486,7 +2242,7 @@
             <a:pPr rtl="0"/>
             <a:fld id="{22289C57-55D7-40A4-A101-E74FAC7A092B}" type="slidenum">
               <a:rPr lang="de-DE" smtClean="0"/>
-              <a:t>9</a:t>
+              <a:t>8</a:t>
             </a:fld>
             <a:endParaRPr lang="de-DE" dirty="0"/>
           </a:p>
@@ -2496,6 +2252,131 @@
     <p:extLst>
       <p:ext uri="{BB962C8B-B14F-4D97-AF65-F5344CB8AC3E}">
         <p14:creationId xmlns:p14="http://schemas.microsoft.com/office/powerpoint/2010/main" val="3077483162"/>
+      </p:ext>
+    </p:extLst>
+  </p:cSld>
+  <p:clrMapOvr>
+    <a:masterClrMapping/>
+  </p:clrMapOvr>
+</p:notes>
+</file>
+
+<file path=ppt/notesSlides/notesSlide9.xml><?xml version="1.0" encoding="utf-8"?>
+<p:notes xmlns:a="http://schemas.openxmlformats.org/drawingml/2006/main" xmlns:r="http://schemas.openxmlformats.org/officeDocument/2006/relationships" xmlns:p="http://schemas.openxmlformats.org/presentationml/2006/main">
+  <p:cSld>
+    <p:spTree>
+      <p:nvGrpSpPr>
+        <p:cNvPr id="1" name="">
+          <a:extLst>
+            <a:ext uri="{FF2B5EF4-FFF2-40B4-BE49-F238E27FC236}">
+              <a16:creationId xmlns:a16="http://schemas.microsoft.com/office/drawing/2014/main" id="{E3C3BA0F-5D2A-638D-61CF-5BA6EB3F06B8}"/>
+            </a:ext>
+          </a:extLst>
+        </p:cNvPr>
+        <p:cNvGrpSpPr/>
+        <p:nvPr/>
+      </p:nvGrpSpPr>
+      <p:grpSpPr>
+        <a:xfrm>
+          <a:off x="0" y="0"/>
+          <a:ext cx="0" cy="0"/>
+          <a:chOff x="0" y="0"/>
+          <a:chExt cx="0" cy="0"/>
+        </a:xfrm>
+      </p:grpSpPr>
+      <p:sp>
+        <p:nvSpPr>
+          <p:cNvPr id="2" name="Folienbildplatzhalter 1">
+            <a:extLst>
+              <a:ext uri="{FF2B5EF4-FFF2-40B4-BE49-F238E27FC236}">
+                <a16:creationId xmlns:a16="http://schemas.microsoft.com/office/drawing/2014/main" id="{937A1B87-E5AD-8D54-6AA7-5C77A023EDC4}"/>
+              </a:ext>
+            </a:extLst>
+          </p:cNvPr>
+          <p:cNvSpPr>
+            <a:spLocks noGrp="1" noRot="1" noChangeAspect="1"/>
+          </p:cNvSpPr>
+          <p:nvPr>
+            <p:ph type="sldImg"/>
+          </p:nvPr>
+        </p:nvSpPr>
+        <p:spPr/>
+      </p:sp>
+      <p:sp>
+        <p:nvSpPr>
+          <p:cNvPr id="3" name="Notizenplatzhalter 2">
+            <a:extLst>
+              <a:ext uri="{FF2B5EF4-FFF2-40B4-BE49-F238E27FC236}">
+                <a16:creationId xmlns:a16="http://schemas.microsoft.com/office/drawing/2014/main" id="{145905E5-EE54-1192-646F-4408E3088B6A}"/>
+              </a:ext>
+            </a:extLst>
+          </p:cNvPr>
+          <p:cNvSpPr>
+            <a:spLocks noGrp="1"/>
+          </p:cNvSpPr>
+          <p:nvPr>
+            <p:ph type="body" idx="1"/>
+          </p:nvPr>
+        </p:nvSpPr>
+        <p:spPr/>
+        <p:txBody>
+          <a:bodyPr rtlCol="0"/>
+          <a:lstStyle>
+            <a:defPPr>
+              <a:defRPr lang="de-DE"/>
+            </a:defPPr>
+          </a:lstStyle>
+          <a:p>
+            <a:pPr rtl="0"/>
+            <a:r>
+              <a:rPr lang="en-US" dirty="0"/>
+              <a:t>As you can also see, the quantized models are 90% smaller than the baseline model. So using GPTQ we were able to greatly reduce the model size without losing any performance.</a:t>
+            </a:r>
+          </a:p>
+          <a:p>
+            <a:pPr rtl="0"/>
+            <a:endParaRPr lang="de-DE" dirty="0"/>
+          </a:p>
+        </p:txBody>
+      </p:sp>
+      <p:sp>
+        <p:nvSpPr>
+          <p:cNvPr id="4" name="Foliennummernplatzhalter 3">
+            <a:extLst>
+              <a:ext uri="{FF2B5EF4-FFF2-40B4-BE49-F238E27FC236}">
+                <a16:creationId xmlns:a16="http://schemas.microsoft.com/office/drawing/2014/main" id="{B91F591C-EF7F-71C5-8B0D-495698AEB1A9}"/>
+              </a:ext>
+            </a:extLst>
+          </p:cNvPr>
+          <p:cNvSpPr>
+            <a:spLocks noGrp="1"/>
+          </p:cNvSpPr>
+          <p:nvPr>
+            <p:ph type="sldNum" sz="quarter" idx="5"/>
+          </p:nvPr>
+        </p:nvSpPr>
+        <p:spPr/>
+        <p:txBody>
+          <a:bodyPr rtlCol="0"/>
+          <a:lstStyle>
+            <a:defPPr>
+              <a:defRPr lang="de-DE"/>
+            </a:defPPr>
+          </a:lstStyle>
+          <a:p>
+            <a:pPr rtl="0"/>
+            <a:fld id="{22289C57-55D7-40A4-A101-E74FAC7A092B}" type="slidenum">
+              <a:rPr lang="de-DE" smtClean="0"/>
+              <a:t>9</a:t>
+            </a:fld>
+            <a:endParaRPr lang="de-DE" dirty="0"/>
+          </a:p>
+        </p:txBody>
+      </p:sp>
+    </p:spTree>
+    <p:extLst>
+      <p:ext uri="{BB962C8B-B14F-4D97-AF65-F5344CB8AC3E}">
+        <p14:creationId xmlns:p14="http://schemas.microsoft.com/office/powerpoint/2010/main" val="3333490565"/>
       </p:ext>
     </p:extLst>
   </p:cSld>
@@ -8137,7 +8018,7 @@
         <p:cNvPr id="1" name="">
           <a:extLst>
             <a:ext uri="{FF2B5EF4-FFF2-40B4-BE49-F238E27FC236}">
-              <a16:creationId xmlns:a16="http://schemas.microsoft.com/office/drawing/2014/main" id="{59FD9846-BDA0-98D3-2271-772D57BD7AA1}"/>
+              <a16:creationId xmlns:a16="http://schemas.microsoft.com/office/drawing/2014/main" id="{EED86F20-E165-85BF-DD8E-623DB0173D49}"/>
             </a:ext>
           </a:extLst>
         </p:cNvPr>
@@ -8154,10 +8035,10 @@
       </p:grpSpPr>
       <p:sp>
         <p:nvSpPr>
-          <p:cNvPr id="16" name="Titel 1">
-            <a:extLst>
-              <a:ext uri="{FF2B5EF4-FFF2-40B4-BE49-F238E27FC236}">
-                <a16:creationId xmlns:a16="http://schemas.microsoft.com/office/drawing/2014/main" id="{C613510E-925B-8532-8B02-A525CBA5E93D}"/>
+          <p:cNvPr id="4" name="Titel 3">
+            <a:extLst>
+              <a:ext uri="{FF2B5EF4-FFF2-40B4-BE49-F238E27FC236}">
+                <a16:creationId xmlns:a16="http://schemas.microsoft.com/office/drawing/2014/main" id="{095A912F-E62E-BCA9-7AA6-1BCBB3A17BB0}"/>
               </a:ext>
             </a:extLst>
           </p:cNvPr>
@@ -8170,432 +8051,58 @@
         </p:nvSpPr>
         <p:spPr>
           <a:xfrm>
-            <a:off x="2699083" y="352103"/>
-            <a:ext cx="6878217" cy="653321"/>
+            <a:off x="597647" y="457073"/>
+            <a:ext cx="5655197" cy="548351"/>
           </a:xfrm>
         </p:spPr>
         <p:txBody>
-          <a:bodyPr rtlCol="0" anchor="b">
-            <a:noAutofit/>
-          </a:bodyPr>
-          <a:lstStyle>
-            <a:defPPr>
-              <a:defRPr lang="de-DE"/>
-            </a:defPPr>
-          </a:lstStyle>
-          <a:p>
-            <a:pPr rtl="0"/>
-            <a:r>
-              <a:rPr lang="de-DE" dirty="0" err="1"/>
-              <a:t>Results</a:t>
-            </a:r>
-            <a:endParaRPr lang="de-DE" dirty="0"/>
+          <a:bodyPr/>
+          <a:lstStyle/>
+          <a:p>
+            <a:r>
+              <a:rPr lang="de-AT" dirty="0"/>
+              <a:t>Demonstration</a:t>
+            </a:r>
           </a:p>
         </p:txBody>
       </p:sp>
-      <p:graphicFrame>
-        <p:nvGraphicFramePr>
-          <p:cNvPr id="6" name="Tabelle 5">
-            <a:extLst>
-              <a:ext uri="{FF2B5EF4-FFF2-40B4-BE49-F238E27FC236}">
-                <a16:creationId xmlns:a16="http://schemas.microsoft.com/office/drawing/2014/main" id="{03E991BE-AC5C-71E3-3848-F8F3315293ED}"/>
-              </a:ext>
-            </a:extLst>
-          </p:cNvPr>
-          <p:cNvGraphicFramePr>
-            <a:graphicFrameLocks noGrp="1"/>
-          </p:cNvGraphicFramePr>
-          <p:nvPr>
-            <p:extLst>
-              <p:ext uri="{D42A27DB-BD31-4B8C-83A1-F6EECF244321}">
-                <p14:modId xmlns:p14="http://schemas.microsoft.com/office/powerpoint/2010/main" val="3866494795"/>
-              </p:ext>
-            </p:extLst>
-          </p:nvPr>
-        </p:nvGraphicFramePr>
-        <p:xfrm>
-          <a:off x="2561046" y="1529560"/>
-          <a:ext cx="8411754" cy="3199884"/>
-        </p:xfrm>
-        <a:graphic>
-          <a:graphicData uri="http://schemas.openxmlformats.org/drawingml/2006/table">
-            <a:tbl>
-              <a:tblPr firstRow="1" bandRow="1">
-                <a:tableStyleId>{5C22544A-7EE6-4342-B048-85BDC9FD1C3A}</a:tableStyleId>
-              </a:tblPr>
-              <a:tblGrid>
-                <a:gridCol w="2803918">
-                  <a:extLst>
-                    <a:ext uri="{9D8B030D-6E8A-4147-A177-3AD203B41FA5}">
-                      <a16:colId xmlns:a16="http://schemas.microsoft.com/office/drawing/2014/main" val="3969413928"/>
-                    </a:ext>
-                  </a:extLst>
-                </a:gridCol>
-                <a:gridCol w="3250542">
-                  <a:extLst>
-                    <a:ext uri="{9D8B030D-6E8A-4147-A177-3AD203B41FA5}">
-                      <a16:colId xmlns:a16="http://schemas.microsoft.com/office/drawing/2014/main" val="3747705379"/>
-                    </a:ext>
-                  </a:extLst>
-                </a:gridCol>
-                <a:gridCol w="2357294">
-                  <a:extLst>
-                    <a:ext uri="{9D8B030D-6E8A-4147-A177-3AD203B41FA5}">
-                      <a16:colId xmlns:a16="http://schemas.microsoft.com/office/drawing/2014/main" val="3648378356"/>
-                    </a:ext>
-                  </a:extLst>
-                </a:gridCol>
-              </a:tblGrid>
-              <a:tr h="799971">
-                <a:tc>
-                  <a:txBody>
-                    <a:bodyPr/>
-                    <a:lstStyle/>
-                    <a:p>
-                      <a:pPr algn="l"/>
-                      <a:r>
-                        <a:rPr lang="de-AT" dirty="0">
-                          <a:solidFill>
-                            <a:schemeClr val="tx1"/>
-                          </a:solidFill>
-                        </a:rPr>
-                        <a:t>Model Variant</a:t>
-                      </a:r>
-                    </a:p>
-                  </a:txBody>
-                  <a:tcPr anchor="ctr"/>
-                </a:tc>
-                <a:tc>
-                  <a:txBody>
-                    <a:bodyPr/>
-                    <a:lstStyle/>
-                    <a:p>
-                      <a:pPr algn="l"/>
-                      <a:r>
-                        <a:rPr lang="de-AT" dirty="0" err="1">
-                          <a:solidFill>
-                            <a:schemeClr val="tx1"/>
-                          </a:solidFill>
-                        </a:rPr>
-                        <a:t>Perplexity</a:t>
-                      </a:r>
-                      <a:r>
-                        <a:rPr lang="de-AT" dirty="0">
-                          <a:solidFill>
-                            <a:schemeClr val="tx1"/>
-                          </a:solidFill>
-                        </a:rPr>
-                        <a:t> (</a:t>
-                      </a:r>
-                      <a:r>
-                        <a:rPr lang="de-AT" dirty="0" err="1">
-                          <a:solidFill>
-                            <a:schemeClr val="tx1"/>
-                          </a:solidFill>
-                        </a:rPr>
-                        <a:t>lower</a:t>
-                      </a:r>
-                      <a:r>
-                        <a:rPr lang="de-AT" dirty="0">
-                          <a:solidFill>
-                            <a:schemeClr val="tx1"/>
-                          </a:solidFill>
-                        </a:rPr>
-                        <a:t> </a:t>
-                      </a:r>
-                      <a:r>
-                        <a:rPr lang="de-AT" dirty="0" err="1">
-                          <a:solidFill>
-                            <a:schemeClr val="tx1"/>
-                          </a:solidFill>
-                        </a:rPr>
-                        <a:t>is</a:t>
-                      </a:r>
-                      <a:r>
-                        <a:rPr lang="de-AT" dirty="0">
-                          <a:solidFill>
-                            <a:schemeClr val="tx1"/>
-                          </a:solidFill>
-                        </a:rPr>
-                        <a:t> </a:t>
-                      </a:r>
-                      <a:r>
-                        <a:rPr lang="de-AT" dirty="0" err="1">
-                          <a:solidFill>
-                            <a:schemeClr val="tx1"/>
-                          </a:solidFill>
-                        </a:rPr>
-                        <a:t>better</a:t>
-                      </a:r>
-                      <a:r>
-                        <a:rPr lang="de-AT" dirty="0">
-                          <a:solidFill>
-                            <a:schemeClr val="tx1"/>
-                          </a:solidFill>
-                        </a:rPr>
-                        <a:t>)</a:t>
-                      </a:r>
-                    </a:p>
-                  </a:txBody>
-                  <a:tcPr anchor="ctr"/>
-                </a:tc>
-                <a:tc>
-                  <a:txBody>
-                    <a:bodyPr/>
-                    <a:lstStyle/>
-                    <a:p>
-                      <a:pPr algn="l"/>
-                      <a:r>
-                        <a:rPr lang="de-AT" dirty="0">
-                          <a:solidFill>
-                            <a:schemeClr val="tx1"/>
-                          </a:solidFill>
-                        </a:rPr>
-                        <a:t>Model </a:t>
-                      </a:r>
-                      <a:r>
-                        <a:rPr lang="de-AT" dirty="0" err="1">
-                          <a:solidFill>
-                            <a:schemeClr val="tx1"/>
-                          </a:solidFill>
-                        </a:rPr>
-                        <a:t>size</a:t>
-                      </a:r>
-                      <a:r>
-                        <a:rPr lang="de-AT" dirty="0">
-                          <a:solidFill>
-                            <a:schemeClr val="tx1"/>
-                          </a:solidFill>
-                        </a:rPr>
-                        <a:t> </a:t>
-                      </a:r>
-                    </a:p>
-                  </a:txBody>
-                  <a:tcPr anchor="ctr"/>
-                </a:tc>
-                <a:extLst>
-                  <a:ext uri="{0D108BD9-81ED-4DB2-BD59-A6C34878D82A}">
-                    <a16:rowId xmlns:a16="http://schemas.microsoft.com/office/drawing/2014/main" val="229597958"/>
-                  </a:ext>
-                </a:extLst>
-              </a:tr>
-              <a:tr h="799971">
-                <a:tc>
-                  <a:txBody>
-                    <a:bodyPr/>
-                    <a:lstStyle/>
-                    <a:p>
-                      <a:pPr algn="l"/>
-                      <a:r>
-                        <a:rPr lang="de-AT" dirty="0">
-                          <a:solidFill>
-                            <a:schemeClr val="tx1"/>
-                          </a:solidFill>
-                        </a:rPr>
-                        <a:t>Baseline (float32)</a:t>
-                      </a:r>
-                    </a:p>
-                  </a:txBody>
-                  <a:tcPr anchor="ctr"/>
-                </a:tc>
-                <a:tc>
-                  <a:txBody>
-                    <a:bodyPr/>
-                    <a:lstStyle/>
-                    <a:p>
-                      <a:pPr algn="l"/>
-                      <a:r>
-                        <a:rPr lang="de-AT" dirty="0">
-                          <a:solidFill>
-                            <a:schemeClr val="accent6">
-                              <a:lumMod val="75000"/>
-                            </a:schemeClr>
-                          </a:solidFill>
-                        </a:rPr>
-                        <a:t>2.76</a:t>
-                      </a:r>
-                    </a:p>
-                  </a:txBody>
-                  <a:tcPr anchor="ctr"/>
-                </a:tc>
-                <a:tc>
-                  <a:txBody>
-                    <a:bodyPr/>
-                    <a:lstStyle/>
-                    <a:p>
-                      <a:pPr algn="l"/>
-                      <a:r>
-                        <a:rPr lang="de-AT" dirty="0">
-                          <a:solidFill>
-                            <a:srgbClr val="C00000"/>
-                          </a:solidFill>
-                        </a:rPr>
-                        <a:t>31.9 MB</a:t>
-                      </a:r>
-                    </a:p>
-                  </a:txBody>
-                  <a:tcPr anchor="ctr"/>
-                </a:tc>
-                <a:extLst>
-                  <a:ext uri="{0D108BD9-81ED-4DB2-BD59-A6C34878D82A}">
-                    <a16:rowId xmlns:a16="http://schemas.microsoft.com/office/drawing/2014/main" val="3001397675"/>
-                  </a:ext>
-                </a:extLst>
-              </a:tr>
-              <a:tr h="799971">
-                <a:tc>
-                  <a:txBody>
-                    <a:bodyPr/>
-                    <a:lstStyle/>
-                    <a:p>
-                      <a:pPr algn="l"/>
-                      <a:r>
-                        <a:rPr lang="de-AT" dirty="0">
-                          <a:solidFill>
-                            <a:schemeClr val="tx1"/>
-                          </a:solidFill>
-                        </a:rPr>
-                        <a:t>Naive </a:t>
-                      </a:r>
-                      <a:r>
-                        <a:rPr lang="de-AT" dirty="0" err="1">
-                          <a:solidFill>
-                            <a:schemeClr val="tx1"/>
-                          </a:solidFill>
-                        </a:rPr>
-                        <a:t>Quantization</a:t>
-                      </a:r>
-                      <a:r>
-                        <a:rPr lang="de-AT" dirty="0">
-                          <a:solidFill>
-                            <a:schemeClr val="tx1"/>
-                          </a:solidFill>
-                        </a:rPr>
-                        <a:t> (int8)</a:t>
-                      </a:r>
-                    </a:p>
-                  </a:txBody>
-                  <a:tcPr anchor="ctr"/>
-                </a:tc>
-                <a:tc>
-                  <a:txBody>
-                    <a:bodyPr/>
-                    <a:lstStyle/>
-                    <a:p>
-                      <a:pPr algn="l"/>
-                      <a:r>
-                        <a:rPr lang="de-AT" dirty="0">
-                          <a:solidFill>
-                            <a:srgbClr val="C00000"/>
-                          </a:solidFill>
-                        </a:rPr>
-                        <a:t>2.78</a:t>
-                      </a:r>
-                    </a:p>
-                  </a:txBody>
-                  <a:tcPr anchor="ctr"/>
-                </a:tc>
-                <a:tc>
-                  <a:txBody>
-                    <a:bodyPr/>
-                    <a:lstStyle/>
-                    <a:p>
-                      <a:pPr algn="l"/>
-                      <a:r>
-                        <a:rPr lang="de-AT" dirty="0">
-                          <a:solidFill>
-                            <a:schemeClr val="accent6">
-                              <a:lumMod val="75000"/>
-                            </a:schemeClr>
-                          </a:solidFill>
-                        </a:rPr>
-                        <a:t>2.9 MB</a:t>
-                      </a:r>
-                    </a:p>
-                  </a:txBody>
-                  <a:tcPr anchor="ctr"/>
-                </a:tc>
-                <a:extLst>
-                  <a:ext uri="{0D108BD9-81ED-4DB2-BD59-A6C34878D82A}">
-                    <a16:rowId xmlns:a16="http://schemas.microsoft.com/office/drawing/2014/main" val="1022930641"/>
-                  </a:ext>
-                </a:extLst>
-              </a:tr>
-              <a:tr h="799971">
-                <a:tc>
-                  <a:txBody>
-                    <a:bodyPr/>
-                    <a:lstStyle/>
-                    <a:p>
-                      <a:pPr algn="l"/>
-                      <a:r>
-                        <a:rPr lang="de-AT" dirty="0">
-                          <a:solidFill>
-                            <a:schemeClr val="tx1"/>
-                          </a:solidFill>
-                        </a:rPr>
-                        <a:t>GPTQ (int8)</a:t>
-                      </a:r>
-                    </a:p>
-                  </a:txBody>
-                  <a:tcPr anchor="ctr"/>
-                </a:tc>
-                <a:tc>
-                  <a:txBody>
-                    <a:bodyPr/>
-                    <a:lstStyle/>
-                    <a:p>
-                      <a:pPr algn="l"/>
-                      <a:r>
-                        <a:rPr lang="de-AT" dirty="0">
-                          <a:solidFill>
-                            <a:schemeClr val="accent6">
-                              <a:lumMod val="75000"/>
-                            </a:schemeClr>
-                          </a:solidFill>
-                        </a:rPr>
-                        <a:t>2.76</a:t>
-                      </a:r>
-                    </a:p>
-                  </a:txBody>
-                  <a:tcPr anchor="ctr"/>
-                </a:tc>
-                <a:tc>
-                  <a:txBody>
-                    <a:bodyPr/>
-                    <a:lstStyle/>
-                    <a:p>
-                      <a:pPr algn="l"/>
-                      <a:r>
-                        <a:rPr lang="de-AT" dirty="0">
-                          <a:solidFill>
-                            <a:schemeClr val="accent6">
-                              <a:lumMod val="75000"/>
-                            </a:schemeClr>
-                          </a:solidFill>
-                        </a:rPr>
-                        <a:t>2.9 MB</a:t>
-                      </a:r>
-                    </a:p>
-                  </a:txBody>
-                  <a:tcPr anchor="ctr"/>
-                </a:tc>
-                <a:extLst>
-                  <a:ext uri="{0D108BD9-81ED-4DB2-BD59-A6C34878D82A}">
-                    <a16:rowId xmlns:a16="http://schemas.microsoft.com/office/drawing/2014/main" val="2095179141"/>
-                  </a:ext>
-                </a:extLst>
-              </a:tr>
-            </a:tbl>
-          </a:graphicData>
-        </a:graphic>
-      </p:graphicFrame>
+      <p:pic>
+        <p:nvPicPr>
+          <p:cNvPr id="9" name="Grafik 8" descr="Ein Bild, das Text, Screenshot enthält.&#10;&#10;KI-generierte Inhalte können fehlerhaft sein.">
+            <a:extLst>
+              <a:ext uri="{FF2B5EF4-FFF2-40B4-BE49-F238E27FC236}">
+                <a16:creationId xmlns:a16="http://schemas.microsoft.com/office/drawing/2014/main" id="{F0AC5537-8BBD-6989-15DF-4A9FA8DF4201}"/>
+              </a:ext>
+            </a:extLst>
+          </p:cNvPr>
+          <p:cNvPicPr>
+            <a:picLocks noChangeAspect="1"/>
+          </p:cNvPicPr>
+          <p:nvPr/>
+        </p:nvPicPr>
+        <p:blipFill>
+          <a:blip r:embed="rId3"/>
+          <a:srcRect t="10086"/>
+          <a:stretch>
+            <a:fillRect/>
+          </a:stretch>
+        </p:blipFill>
+        <p:spPr>
+          <a:xfrm>
+            <a:off x="1862921" y="1005424"/>
+            <a:ext cx="8686094" cy="5581652"/>
+          </a:xfrm>
+          <a:prstGeom prst="rect">
+            <a:avLst/>
+          </a:prstGeom>
+        </p:spPr>
+      </p:pic>
       <p:sp>
         <p:nvSpPr>
           <p:cNvPr id="3" name="PB">
             <a:extLst>
               <a:ext uri="{FF2B5EF4-FFF2-40B4-BE49-F238E27FC236}">
-                <a16:creationId xmlns:a16="http://schemas.microsoft.com/office/drawing/2014/main" id="{8E0D94B2-6F55-2E67-62B3-E7444FEC8F71}"/>
+                <a16:creationId xmlns:a16="http://schemas.microsoft.com/office/drawing/2014/main" id="{5507936B-C0A4-E78A-3E73-6920CA9706DB}"/>
               </a:ext>
             </a:extLst>
           </p:cNvPr>
@@ -8605,7 +8112,7 @@
         <p:spPr>
           <a:xfrm>
             <a:off x="0" y="6756400"/>
-            <a:ext cx="8708572" cy="101600"/>
+            <a:ext cx="9579428" cy="101600"/>
           </a:xfrm>
           <a:prstGeom prst="rect">
             <a:avLst/>
@@ -8642,7 +8149,7 @@
     </p:spTree>
     <p:extLst>
       <p:ext uri="{BB962C8B-B14F-4D97-AF65-F5344CB8AC3E}">
-        <p14:creationId xmlns:p14="http://schemas.microsoft.com/office/powerpoint/2010/main" val="3751214146"/>
+        <p14:creationId xmlns:p14="http://schemas.microsoft.com/office/powerpoint/2010/main" val="1765247575"/>
       </p:ext>
     </p:extLst>
   </p:cSld>
@@ -8653,154 +8160,6 @@
 </file>
 
 <file path=ppt/slides/slide11.xml><?xml version="1.0" encoding="utf-8"?>
-<p:sld xmlns:a="http://schemas.openxmlformats.org/drawingml/2006/main" xmlns:r="http://schemas.openxmlformats.org/officeDocument/2006/relationships" xmlns:p="http://schemas.openxmlformats.org/presentationml/2006/main">
-  <p:cSld>
-    <p:spTree>
-      <p:nvGrpSpPr>
-        <p:cNvPr id="1" name="">
-          <a:extLst>
-            <a:ext uri="{FF2B5EF4-FFF2-40B4-BE49-F238E27FC236}">
-              <a16:creationId xmlns:a16="http://schemas.microsoft.com/office/drawing/2014/main" id="{EED86F20-E165-85BF-DD8E-623DB0173D49}"/>
-            </a:ext>
-          </a:extLst>
-        </p:cNvPr>
-        <p:cNvGrpSpPr/>
-        <p:nvPr/>
-      </p:nvGrpSpPr>
-      <p:grpSpPr>
-        <a:xfrm>
-          <a:off x="0" y="0"/>
-          <a:ext cx="0" cy="0"/>
-          <a:chOff x="0" y="0"/>
-          <a:chExt cx="0" cy="0"/>
-        </a:xfrm>
-      </p:grpSpPr>
-      <p:sp>
-        <p:nvSpPr>
-          <p:cNvPr id="4" name="Titel 3">
-            <a:extLst>
-              <a:ext uri="{FF2B5EF4-FFF2-40B4-BE49-F238E27FC236}">
-                <a16:creationId xmlns:a16="http://schemas.microsoft.com/office/drawing/2014/main" id="{095A912F-E62E-BCA9-7AA6-1BCBB3A17BB0}"/>
-              </a:ext>
-            </a:extLst>
-          </p:cNvPr>
-          <p:cNvSpPr>
-            <a:spLocks noGrp="1"/>
-          </p:cNvSpPr>
-          <p:nvPr>
-            <p:ph type="title"/>
-          </p:nvPr>
-        </p:nvSpPr>
-        <p:spPr>
-          <a:xfrm>
-            <a:off x="597647" y="457073"/>
-            <a:ext cx="5655197" cy="548351"/>
-          </a:xfrm>
-        </p:spPr>
-        <p:txBody>
-          <a:bodyPr/>
-          <a:lstStyle/>
-          <a:p>
-            <a:r>
-              <a:rPr lang="de-AT" dirty="0"/>
-              <a:t>Demonstration</a:t>
-            </a:r>
-          </a:p>
-        </p:txBody>
-      </p:sp>
-      <p:pic>
-        <p:nvPicPr>
-          <p:cNvPr id="9" name="Grafik 8" descr="Ein Bild, das Text, Screenshot enthält.&#10;&#10;KI-generierte Inhalte können fehlerhaft sein.">
-            <a:extLst>
-              <a:ext uri="{FF2B5EF4-FFF2-40B4-BE49-F238E27FC236}">
-                <a16:creationId xmlns:a16="http://schemas.microsoft.com/office/drawing/2014/main" id="{F0AC5537-8BBD-6989-15DF-4A9FA8DF4201}"/>
-              </a:ext>
-            </a:extLst>
-          </p:cNvPr>
-          <p:cNvPicPr>
-            <a:picLocks noChangeAspect="1"/>
-          </p:cNvPicPr>
-          <p:nvPr/>
-        </p:nvPicPr>
-        <p:blipFill>
-          <a:blip r:embed="rId3"/>
-          <a:stretch>
-            <a:fillRect/>
-          </a:stretch>
-        </p:blipFill>
-        <p:spPr>
-          <a:xfrm>
-            <a:off x="1862921" y="1005424"/>
-            <a:ext cx="7809986" cy="5581652"/>
-          </a:xfrm>
-          <a:prstGeom prst="rect">
-            <a:avLst/>
-          </a:prstGeom>
-        </p:spPr>
-      </p:pic>
-      <p:sp>
-        <p:nvSpPr>
-          <p:cNvPr id="3" name="PB">
-            <a:extLst>
-              <a:ext uri="{FF2B5EF4-FFF2-40B4-BE49-F238E27FC236}">
-                <a16:creationId xmlns:a16="http://schemas.microsoft.com/office/drawing/2014/main" id="{5507936B-C0A4-E78A-3E73-6920CA9706DB}"/>
-              </a:ext>
-            </a:extLst>
-          </p:cNvPr>
-          <p:cNvSpPr/>
-          <p:nvPr/>
-        </p:nvSpPr>
-        <p:spPr>
-          <a:xfrm>
-            <a:off x="0" y="6756400"/>
-            <a:ext cx="9579428" cy="101600"/>
-          </a:xfrm>
-          <a:prstGeom prst="rect">
-            <a:avLst/>
-          </a:prstGeom>
-          <a:solidFill>
-            <a:srgbClr val="000000"/>
-          </a:solidFill>
-        </p:spPr>
-        <p:style>
-          <a:lnRef idx="2">
-            <a:schemeClr val="accent1">
-              <a:shade val="15000"/>
-            </a:schemeClr>
-          </a:lnRef>
-          <a:fillRef idx="1">
-            <a:schemeClr val="accent1"/>
-          </a:fillRef>
-          <a:effectRef idx="0">
-            <a:schemeClr val="accent1"/>
-          </a:effectRef>
-          <a:fontRef idx="minor">
-            <a:schemeClr val="lt1"/>
-          </a:fontRef>
-        </p:style>
-        <p:txBody>
-          <a:bodyPr rtlCol="0" anchor="ctr"/>
-          <a:lstStyle/>
-          <a:p>
-            <a:pPr algn="ctr"/>
-            <a:endParaRPr lang="de-AT"/>
-          </a:p>
-        </p:txBody>
-      </p:sp>
-    </p:spTree>
-    <p:extLst>
-      <p:ext uri="{BB962C8B-B14F-4D97-AF65-F5344CB8AC3E}">
-        <p14:creationId xmlns:p14="http://schemas.microsoft.com/office/powerpoint/2010/main" val="1765247575"/>
-      </p:ext>
-    </p:extLst>
-  </p:cSld>
-  <p:clrMapOvr>
-    <a:masterClrMapping/>
-  </p:clrMapOvr>
-</p:sld>
-</file>
-
-<file path=ppt/slides/slide12.xml><?xml version="1.0" encoding="utf-8"?>
 <p:sld xmlns:a="http://schemas.openxmlformats.org/drawingml/2006/main" xmlns:r="http://schemas.openxmlformats.org/officeDocument/2006/relationships" xmlns:p="http://schemas.openxmlformats.org/presentationml/2006/main">
   <p:cSld>
     <p:spTree>
@@ -9242,7 +8601,7 @@
 </p:sld>
 </file>
 
-<file path=ppt/slides/slide13.xml><?xml version="1.0" encoding="utf-8"?>
+<file path=ppt/slides/slide12.xml><?xml version="1.0" encoding="utf-8"?>
 <p:sld xmlns:a="http://schemas.openxmlformats.org/drawingml/2006/main" xmlns:r="http://schemas.openxmlformats.org/officeDocument/2006/relationships" xmlns:p="http://schemas.openxmlformats.org/presentationml/2006/main">
   <p:cSld>
     <p:spTree>
@@ -9532,7 +8891,7 @@
           <a:p>
             <a:r>
               <a:rPr lang="en-US" sz="2400" dirty="0"/>
-              <a:t>Learned how to manage and balance expensive training runs</a:t>
+              <a:t>Learned how to manage and balance long training runs</a:t>
             </a:r>
           </a:p>
           <a:p>
@@ -9696,7 +9055,7 @@
 </p:sld>
 </file>
 
-<file path=ppt/slides/slide14.xml><?xml version="1.0" encoding="utf-8"?>
+<file path=ppt/slides/slide13.xml><?xml version="1.0" encoding="utf-8"?>
 <p:sld xmlns:a="http://schemas.openxmlformats.org/drawingml/2006/main" xmlns:r="http://schemas.openxmlformats.org/officeDocument/2006/relationships" xmlns:p="http://schemas.openxmlformats.org/presentationml/2006/main">
   <p:cSld>
     <p:spTree>
@@ -11601,7 +10960,7 @@
           <a:p>
             <a:r>
               <a:rPr lang="en-US" sz="2400" dirty="0"/>
-              <a:t>Or more sophisticated algorithms like GPTQ</a:t>
+              <a:t>Or sophisticated algorithms like GPTQ</a:t>
             </a:r>
           </a:p>
           <a:p>
@@ -12315,7 +11674,7 @@
         <p:spPr>
           <a:xfrm>
             <a:off x="328476" y="2276105"/>
-            <a:ext cx="7561490" cy="2877192"/>
+            <a:ext cx="8779190" cy="2877192"/>
           </a:xfrm>
         </p:spPr>
         <p:txBody>
@@ -12328,14 +11687,9 @@
             </a:defPPr>
           </a:lstStyle>
           <a:p>
-            <a:pPr rtl="0"/>
-            <a:r>
-              <a:rPr lang="de-AT" sz="2400" dirty="0"/>
-              <a:t>Re-</a:t>
-            </a:r>
             <a:r>
               <a:rPr lang="de-AT" sz="2400" dirty="0" err="1"/>
-              <a:t>implemented</a:t>
+              <a:t>Implemented</a:t>
             </a:r>
             <a:r>
               <a:rPr lang="de-AT" sz="2400" dirty="0"/>
@@ -12353,10 +11707,20 @@
               <a:rPr lang="de-AT" sz="2400" dirty="0" err="1"/>
               <a:t>transformer</a:t>
             </a:r>
-            <a:endParaRPr lang="de-AT" sz="2400" dirty="0"/>
-          </a:p>
-          <a:p>
-            <a:pPr rtl="0"/>
+            <a:r>
+              <a:rPr lang="de-AT" sz="2400" dirty="0"/>
+              <a:t> </a:t>
+            </a:r>
+            <a:r>
+              <a:rPr lang="de-AT" sz="2400" dirty="0" err="1"/>
+              <a:t>from</a:t>
+            </a:r>
+            <a:r>
+              <a:rPr lang="de-AT" sz="2400" dirty="0"/>
+              <a:t> scratch</a:t>
+            </a:r>
+          </a:p>
+          <a:p>
             <a:r>
               <a:rPr lang="de-AT" sz="2400" dirty="0" err="1"/>
               <a:t>Trained</a:t>
@@ -12371,7 +11735,7 @@
             </a:r>
             <a:r>
               <a:rPr lang="de-AT" sz="2400" dirty="0"/>
-              <a:t> on a 10 MB </a:t>
+              <a:t> on a </a:t>
             </a:r>
             <a:r>
               <a:rPr lang="de-AT" sz="2400" dirty="0" err="1"/>
@@ -12385,7 +11749,18 @@
               <a:rPr lang="de-AT" sz="2400" dirty="0" err="1"/>
               <a:t>dataset</a:t>
             </a:r>
-            <a:endParaRPr lang="de-AT" sz="2400" dirty="0"/>
+            <a:r>
+              <a:rPr lang="de-AT" sz="2400" dirty="0"/>
+              <a:t> </a:t>
+            </a:r>
+            <a:r>
+              <a:rPr lang="de-AT" sz="2400" dirty="0" err="1"/>
+              <a:t>for</a:t>
+            </a:r>
+            <a:r>
+              <a:rPr lang="de-AT" sz="2400" dirty="0"/>
+              <a:t> 11h</a:t>
+            </a:r>
           </a:p>
         </p:txBody>
       </p:sp>
@@ -12625,7 +12000,7 @@
         <p:spPr>
           <a:xfrm>
             <a:off x="328476" y="2276105"/>
-            <a:ext cx="7561490" cy="2877192"/>
+            <a:ext cx="8979026" cy="2877192"/>
           </a:xfrm>
         </p:spPr>
         <p:txBody>
@@ -12640,12 +12015,8 @@
           <a:p>
             <a:pPr rtl="0"/>
             <a:r>
-              <a:rPr lang="de-AT" sz="2400" dirty="0"/>
-              <a:t>Re-</a:t>
-            </a:r>
-            <a:r>
               <a:rPr lang="de-AT" sz="2400" dirty="0" err="1"/>
-              <a:t>implemented</a:t>
+              <a:t>Implemented</a:t>
             </a:r>
             <a:r>
               <a:rPr lang="de-AT" sz="2400" dirty="0"/>
@@ -12663,7 +12034,18 @@
               <a:rPr lang="de-AT" sz="2400" dirty="0" err="1"/>
               <a:t>transformer</a:t>
             </a:r>
-            <a:endParaRPr lang="de-AT" sz="2400" dirty="0"/>
+            <a:r>
+              <a:rPr lang="de-AT" sz="2400" dirty="0"/>
+              <a:t> </a:t>
+            </a:r>
+            <a:r>
+              <a:rPr lang="de-AT" sz="2400" dirty="0" err="1"/>
+              <a:t>from</a:t>
+            </a:r>
+            <a:r>
+              <a:rPr lang="de-AT" sz="2400" dirty="0"/>
+              <a:t> scratch</a:t>
+            </a:r>
           </a:p>
           <a:p>
             <a:pPr rtl="0"/>
@@ -12681,7 +12063,7 @@
             </a:r>
             <a:r>
               <a:rPr lang="de-AT" sz="2400" dirty="0"/>
-              <a:t> on a 10 MB </a:t>
+              <a:t> on a </a:t>
             </a:r>
             <a:r>
               <a:rPr lang="de-AT" sz="2400" dirty="0" err="1"/>
@@ -12695,7 +12077,18 @@
               <a:rPr lang="de-AT" sz="2400" dirty="0" err="1"/>
               <a:t>dataset</a:t>
             </a:r>
-            <a:endParaRPr lang="de-AT" sz="2400" dirty="0"/>
+            <a:r>
+              <a:rPr lang="de-AT" sz="2400" dirty="0"/>
+              <a:t> </a:t>
+            </a:r>
+            <a:r>
+              <a:rPr lang="de-AT" sz="2400" dirty="0" err="1"/>
+              <a:t>for</a:t>
+            </a:r>
+            <a:r>
+              <a:rPr lang="de-AT" sz="2400" dirty="0"/>
+              <a:t> 11h</a:t>
+            </a:r>
           </a:p>
           <a:p>
             <a:pPr rtl="0"/>
@@ -12941,438 +12334,6 @@
 </file>
 
 <file path=ppt/slides/slide8.xml><?xml version="1.0" encoding="utf-8"?>
-<p:sld xmlns:a="http://schemas.openxmlformats.org/drawingml/2006/main" xmlns:r="http://schemas.openxmlformats.org/officeDocument/2006/relationships" xmlns:p="http://schemas.openxmlformats.org/presentationml/2006/main">
-  <p:cSld>
-    <p:spTree>
-      <p:nvGrpSpPr>
-        <p:cNvPr id="1" name="">
-          <a:extLst>
-            <a:ext uri="{FF2B5EF4-FFF2-40B4-BE49-F238E27FC236}">
-              <a16:creationId xmlns:a16="http://schemas.microsoft.com/office/drawing/2014/main" id="{FC7B67A1-3E18-1B0A-7A84-D9CA48D45B31}"/>
-            </a:ext>
-          </a:extLst>
-        </p:cNvPr>
-        <p:cNvGrpSpPr/>
-        <p:nvPr/>
-      </p:nvGrpSpPr>
-      <p:grpSpPr>
-        <a:xfrm>
-          <a:off x="0" y="0"/>
-          <a:ext cx="0" cy="0"/>
-          <a:chOff x="0" y="0"/>
-          <a:chExt cx="0" cy="0"/>
-        </a:xfrm>
-      </p:grpSpPr>
-      <p:sp>
-        <p:nvSpPr>
-          <p:cNvPr id="17" name="Titel 1">
-            <a:extLst>
-              <a:ext uri="{FF2B5EF4-FFF2-40B4-BE49-F238E27FC236}">
-                <a16:creationId xmlns:a16="http://schemas.microsoft.com/office/drawing/2014/main" id="{533B8653-56A2-7BDD-FCB0-C8EE6F7A99CD}"/>
-              </a:ext>
-            </a:extLst>
-          </p:cNvPr>
-          <p:cNvSpPr>
-            <a:spLocks noGrp="1"/>
-          </p:cNvSpPr>
-          <p:nvPr>
-            <p:ph type="title"/>
-          </p:nvPr>
-        </p:nvSpPr>
-        <p:spPr>
-          <a:xfrm>
-            <a:off x="328476" y="1622784"/>
-            <a:ext cx="5133392" cy="653321"/>
-          </a:xfrm>
-        </p:spPr>
-        <p:txBody>
-          <a:bodyPr rtlCol="0" anchor="b"/>
-          <a:lstStyle>
-            <a:defPPr>
-              <a:defRPr lang="de-DE"/>
-            </a:defPPr>
-          </a:lstStyle>
-          <a:p>
-            <a:pPr rtl="0"/>
-            <a:r>
-              <a:rPr lang="de-DE" dirty="0" err="1"/>
-              <a:t>What</a:t>
-            </a:r>
-            <a:r>
-              <a:rPr lang="de-DE" dirty="0"/>
-              <a:t> I </a:t>
-            </a:r>
-            <a:r>
-              <a:rPr lang="de-DE" dirty="0" err="1"/>
-              <a:t>did</a:t>
-            </a:r>
-            <a:endParaRPr lang="de-DE" dirty="0"/>
-          </a:p>
-        </p:txBody>
-      </p:sp>
-      <p:sp>
-        <p:nvSpPr>
-          <p:cNvPr id="20" name="Inhaltsplatzhalter 3">
-            <a:extLst>
-              <a:ext uri="{FF2B5EF4-FFF2-40B4-BE49-F238E27FC236}">
-                <a16:creationId xmlns:a16="http://schemas.microsoft.com/office/drawing/2014/main" id="{7F933216-1E0C-7AC6-BE3B-DEB2F7B5589B}"/>
-              </a:ext>
-            </a:extLst>
-          </p:cNvPr>
-          <p:cNvSpPr>
-            <a:spLocks noGrp="1"/>
-          </p:cNvSpPr>
-          <p:nvPr>
-            <p:ph sz="half" idx="2"/>
-          </p:nvPr>
-        </p:nvSpPr>
-        <p:spPr>
-          <a:xfrm>
-            <a:off x="328476" y="2276105"/>
-            <a:ext cx="7561490" cy="2877192"/>
-          </a:xfrm>
-        </p:spPr>
-        <p:txBody>
-          <a:bodyPr rtlCol="0">
-            <a:noAutofit/>
-          </a:bodyPr>
-          <a:lstStyle>
-            <a:defPPr>
-              <a:defRPr lang="de-DE"/>
-            </a:defPPr>
-          </a:lstStyle>
-          <a:p>
-            <a:pPr rtl="0"/>
-            <a:r>
-              <a:rPr lang="de-AT" sz="2400" dirty="0"/>
-              <a:t>Re-</a:t>
-            </a:r>
-            <a:r>
-              <a:rPr lang="de-AT" sz="2400" dirty="0" err="1"/>
-              <a:t>implemented</a:t>
-            </a:r>
-            <a:r>
-              <a:rPr lang="de-AT" sz="2400" dirty="0"/>
-              <a:t> a 2-3 M </a:t>
-            </a:r>
-            <a:r>
-              <a:rPr lang="de-AT" sz="2400" dirty="0" err="1"/>
-              <a:t>parameter</a:t>
-            </a:r>
-            <a:r>
-              <a:rPr lang="de-AT" sz="2400" dirty="0"/>
-              <a:t> </a:t>
-            </a:r>
-            <a:r>
-              <a:rPr lang="de-AT" sz="2400" dirty="0" err="1"/>
-              <a:t>transformer</a:t>
-            </a:r>
-            <a:endParaRPr lang="de-AT" sz="2400" dirty="0"/>
-          </a:p>
-          <a:p>
-            <a:pPr rtl="0"/>
-            <a:r>
-              <a:rPr lang="de-AT" sz="2400" dirty="0" err="1"/>
-              <a:t>Trained</a:t>
-            </a:r>
-            <a:r>
-              <a:rPr lang="de-AT" sz="2400" dirty="0"/>
-              <a:t> </a:t>
-            </a:r>
-            <a:r>
-              <a:rPr lang="de-AT" sz="2400" dirty="0" err="1"/>
-              <a:t>it</a:t>
-            </a:r>
-            <a:r>
-              <a:rPr lang="de-AT" sz="2400" dirty="0"/>
-              <a:t> on a 10 MB </a:t>
-            </a:r>
-            <a:r>
-              <a:rPr lang="de-AT" sz="2400" dirty="0" err="1"/>
-              <a:t>text</a:t>
-            </a:r>
-            <a:r>
-              <a:rPr lang="de-AT" sz="2400" dirty="0"/>
-              <a:t> </a:t>
-            </a:r>
-            <a:r>
-              <a:rPr lang="de-AT" sz="2400" dirty="0" err="1"/>
-              <a:t>dataset</a:t>
-            </a:r>
-            <a:endParaRPr lang="de-AT" sz="2400" dirty="0"/>
-          </a:p>
-          <a:p>
-            <a:pPr rtl="0"/>
-            <a:r>
-              <a:rPr lang="de-AT" sz="2400" dirty="0" err="1"/>
-              <a:t>Implemented</a:t>
-            </a:r>
-            <a:r>
-              <a:rPr lang="de-AT" sz="2400" dirty="0"/>
-              <a:t> </a:t>
-            </a:r>
-            <a:r>
-              <a:rPr lang="de-AT" sz="2400" dirty="0" err="1"/>
-              <a:t>two</a:t>
-            </a:r>
-            <a:r>
-              <a:rPr lang="de-AT" sz="2400" dirty="0"/>
-              <a:t> </a:t>
-            </a:r>
-            <a:r>
-              <a:rPr lang="de-AT" sz="2400" dirty="0" err="1"/>
-              <a:t>quantization</a:t>
-            </a:r>
-            <a:r>
-              <a:rPr lang="de-AT" sz="2400" dirty="0"/>
-              <a:t> </a:t>
-            </a:r>
-            <a:r>
-              <a:rPr lang="de-AT" sz="2400" dirty="0" err="1"/>
-              <a:t>methods</a:t>
-            </a:r>
-            <a:r>
-              <a:rPr lang="de-AT" sz="2400" dirty="0"/>
-              <a:t> </a:t>
-            </a:r>
-            <a:r>
-              <a:rPr lang="de-AT" sz="2400" dirty="0" err="1"/>
-              <a:t>for</a:t>
-            </a:r>
-            <a:r>
-              <a:rPr lang="de-AT" sz="2400" dirty="0"/>
-              <a:t> int8</a:t>
-            </a:r>
-          </a:p>
-          <a:p>
-            <a:pPr rtl="0"/>
-            <a:r>
-              <a:rPr lang="de-AT" sz="2400" dirty="0" err="1"/>
-              <a:t>Quantization</a:t>
-            </a:r>
-            <a:r>
-              <a:rPr lang="de-AT" sz="2400" dirty="0"/>
-              <a:t> </a:t>
-            </a:r>
-            <a:r>
-              <a:rPr lang="de-AT" sz="2400" dirty="0" err="1"/>
-              <a:t>it</a:t>
-            </a:r>
-            <a:r>
-              <a:rPr lang="de-AT" sz="2400" dirty="0"/>
-              <a:t> </a:t>
-            </a:r>
-            <a:r>
-              <a:rPr lang="de-AT" sz="2400" dirty="0" err="1"/>
-              <a:t>using</a:t>
-            </a:r>
-            <a:r>
-              <a:rPr lang="de-AT" sz="2400" dirty="0"/>
-              <a:t> naive </a:t>
-            </a:r>
-            <a:r>
-              <a:rPr lang="de-AT" sz="2400" dirty="0" err="1"/>
-              <a:t>rounding</a:t>
-            </a:r>
-            <a:endParaRPr lang="de-AT" sz="2400" dirty="0"/>
-          </a:p>
-          <a:p>
-            <a:pPr rtl="0"/>
-            <a:r>
-              <a:rPr lang="de-AT" sz="2400" dirty="0" err="1"/>
-              <a:t>Quantization</a:t>
-            </a:r>
-            <a:r>
-              <a:rPr lang="de-AT" sz="2400" dirty="0"/>
-              <a:t> </a:t>
-            </a:r>
-            <a:r>
-              <a:rPr lang="de-AT" sz="2400" dirty="0" err="1"/>
-              <a:t>using</a:t>
-            </a:r>
-            <a:r>
-              <a:rPr lang="de-AT" sz="2400" dirty="0"/>
-              <a:t> GPTQ</a:t>
-            </a:r>
-          </a:p>
-          <a:p>
-            <a:pPr rtl="0"/>
-            <a:r>
-              <a:rPr lang="de-AT" sz="2400" dirty="0" err="1"/>
-              <a:t>Comparison</a:t>
-            </a:r>
-            <a:r>
-              <a:rPr lang="de-AT" sz="2400" dirty="0"/>
-              <a:t>, </a:t>
-            </a:r>
-            <a:r>
-              <a:rPr lang="de-AT" sz="2400" dirty="0" err="1"/>
-              <a:t>evaluation</a:t>
-            </a:r>
-            <a:r>
-              <a:rPr lang="de-AT" sz="2400" dirty="0"/>
-              <a:t>, </a:t>
-            </a:r>
-            <a:r>
-              <a:rPr lang="de-AT" sz="2400" dirty="0" err="1"/>
-              <a:t>demo</a:t>
-            </a:r>
-            <a:r>
-              <a:rPr lang="de-AT" sz="2400" dirty="0"/>
-              <a:t>, …</a:t>
-            </a:r>
-            <a:endParaRPr lang="de-DE" sz="2400" dirty="0"/>
-          </a:p>
-        </p:txBody>
-      </p:sp>
-      <p:sp>
-        <p:nvSpPr>
-          <p:cNvPr id="7" name="Textfeld 6">
-            <a:extLst>
-              <a:ext uri="{FF2B5EF4-FFF2-40B4-BE49-F238E27FC236}">
-                <a16:creationId xmlns:a16="http://schemas.microsoft.com/office/drawing/2014/main" id="{02B2B60E-3D75-C7C0-B2B5-9863A66675D8}"/>
-              </a:ext>
-            </a:extLst>
-          </p:cNvPr>
-          <p:cNvSpPr txBox="1"/>
-          <p:nvPr/>
-        </p:nvSpPr>
-        <p:spPr>
-          <a:xfrm>
-            <a:off x="7217705" y="4799354"/>
-            <a:ext cx="6288770" cy="707886"/>
-          </a:xfrm>
-          <a:prstGeom prst="rect">
-            <a:avLst/>
-          </a:prstGeom>
-          <a:noFill/>
-        </p:spPr>
-        <p:txBody>
-          <a:bodyPr wrap="square">
-            <a:spAutoFit/>
-          </a:bodyPr>
-          <a:lstStyle/>
-          <a:p>
-            <a:r>
-              <a:rPr lang="de-AT" sz="4000" dirty="0">
-                <a:latin typeface="Consolas" panose="020B0609020204030204" pitchFamily="49" charset="0"/>
-              </a:rPr>
-              <a:t>float32 → int8 </a:t>
-            </a:r>
-          </a:p>
-        </p:txBody>
-      </p:sp>
-      <p:sp>
-        <p:nvSpPr>
-          <p:cNvPr id="8" name="Rechteck 7">
-            <a:extLst>
-              <a:ext uri="{FF2B5EF4-FFF2-40B4-BE49-F238E27FC236}">
-                <a16:creationId xmlns:a16="http://schemas.microsoft.com/office/drawing/2014/main" id="{1B7B46FC-EFB4-03CD-A8C2-6E35268F5638}"/>
-              </a:ext>
-            </a:extLst>
-          </p:cNvPr>
-          <p:cNvSpPr/>
-          <p:nvPr/>
-        </p:nvSpPr>
-        <p:spPr>
-          <a:xfrm>
-            <a:off x="7140497" y="4647652"/>
-            <a:ext cx="4372164" cy="1011290"/>
-          </a:xfrm>
-          <a:prstGeom prst="rect">
-            <a:avLst/>
-          </a:prstGeom>
-          <a:noFill/>
-          <a:ln w="10795"/>
-        </p:spPr>
-        <p:style>
-          <a:lnRef idx="2">
-            <a:schemeClr val="accent1">
-              <a:shade val="15000"/>
-            </a:schemeClr>
-          </a:lnRef>
-          <a:fillRef idx="1">
-            <a:schemeClr val="accent1"/>
-          </a:fillRef>
-          <a:effectRef idx="0">
-            <a:schemeClr val="accent1"/>
-          </a:effectRef>
-          <a:fontRef idx="minor">
-            <a:schemeClr val="lt1"/>
-          </a:fontRef>
-        </p:style>
-        <p:txBody>
-          <a:bodyPr rtlCol="0" anchor="ctr"/>
-          <a:lstStyle/>
-          <a:p>
-            <a:pPr algn="ctr"/>
-            <a:endParaRPr lang="de-AT"/>
-          </a:p>
-        </p:txBody>
-      </p:sp>
-      <p:sp>
-        <p:nvSpPr>
-          <p:cNvPr id="3" name="PB">
-            <a:extLst>
-              <a:ext uri="{FF2B5EF4-FFF2-40B4-BE49-F238E27FC236}">
-                <a16:creationId xmlns:a16="http://schemas.microsoft.com/office/drawing/2014/main" id="{E53B1DC2-1718-E4AB-3B12-D9369F1F24DB}"/>
-              </a:ext>
-            </a:extLst>
-          </p:cNvPr>
-          <p:cNvSpPr/>
-          <p:nvPr/>
-        </p:nvSpPr>
-        <p:spPr>
-          <a:xfrm>
-            <a:off x="0" y="6756400"/>
-            <a:ext cx="6966857" cy="101600"/>
-          </a:xfrm>
-          <a:prstGeom prst="rect">
-            <a:avLst/>
-          </a:prstGeom>
-          <a:solidFill>
-            <a:srgbClr val="000000"/>
-          </a:solidFill>
-        </p:spPr>
-        <p:style>
-          <a:lnRef idx="2">
-            <a:schemeClr val="accent1">
-              <a:shade val="15000"/>
-            </a:schemeClr>
-          </a:lnRef>
-          <a:fillRef idx="1">
-            <a:schemeClr val="accent1"/>
-          </a:fillRef>
-          <a:effectRef idx="0">
-            <a:schemeClr val="accent1"/>
-          </a:effectRef>
-          <a:fontRef idx="minor">
-            <a:schemeClr val="lt1"/>
-          </a:fontRef>
-        </p:style>
-        <p:txBody>
-          <a:bodyPr rtlCol="0" anchor="ctr"/>
-          <a:lstStyle/>
-          <a:p>
-            <a:pPr algn="ctr"/>
-            <a:endParaRPr lang="de-AT"/>
-          </a:p>
-        </p:txBody>
-      </p:sp>
-    </p:spTree>
-    <p:extLst>
-      <p:ext uri="{BB962C8B-B14F-4D97-AF65-F5344CB8AC3E}">
-        <p14:creationId xmlns:p14="http://schemas.microsoft.com/office/powerpoint/2010/main" val="231782273"/>
-      </p:ext>
-    </p:extLst>
-  </p:cSld>
-  <p:clrMapOvr>
-    <a:masterClrMapping/>
-  </p:clrMapOvr>
-</p:sld>
-</file>
-
-<file path=ppt/slides/slide9.xml><?xml version="1.0" encoding="utf-8"?>
 <p:sld xmlns:a="http://schemas.openxmlformats.org/drawingml/2006/main" xmlns:r="http://schemas.openxmlformats.org/officeDocument/2006/relationships" xmlns:p="http://schemas.openxmlformats.org/presentationml/2006/main">
   <p:cSld>
     <p:spTree>
@@ -13854,10 +12815,902 @@
           </a:p>
         </p:txBody>
       </p:sp>
+      <p:graphicFrame>
+        <p:nvGraphicFramePr>
+          <p:cNvPr id="2" name="Tabelle 1">
+            <a:extLst>
+              <a:ext uri="{FF2B5EF4-FFF2-40B4-BE49-F238E27FC236}">
+                <a16:creationId xmlns:a16="http://schemas.microsoft.com/office/drawing/2014/main" id="{3E1635DF-F396-4B7C-61B0-A4133491E10E}"/>
+              </a:ext>
+            </a:extLst>
+          </p:cNvPr>
+          <p:cNvGraphicFramePr>
+            <a:graphicFrameLocks noGrp="1"/>
+          </p:cNvGraphicFramePr>
+          <p:nvPr>
+            <p:extLst>
+              <p:ext uri="{D42A27DB-BD31-4B8C-83A1-F6EECF244321}">
+                <p14:modId xmlns:p14="http://schemas.microsoft.com/office/powerpoint/2010/main" val="1971316380"/>
+              </p:ext>
+            </p:extLst>
+          </p:nvPr>
+        </p:nvGraphicFramePr>
+        <p:xfrm>
+          <a:off x="2107359" y="1529560"/>
+          <a:ext cx="9658728" cy="4029508"/>
+        </p:xfrm>
+        <a:graphic>
+          <a:graphicData uri="http://schemas.openxmlformats.org/drawingml/2006/table">
+            <a:tbl>
+              <a:tblPr firstRow="1" bandRow="1">
+                <a:tableStyleId>{5C22544A-7EE6-4342-B048-85BDC9FD1C3A}</a:tableStyleId>
+              </a:tblPr>
+              <a:tblGrid>
+                <a:gridCol w="3736323">
+                  <a:extLst>
+                    <a:ext uri="{9D8B030D-6E8A-4147-A177-3AD203B41FA5}">
+                      <a16:colId xmlns:a16="http://schemas.microsoft.com/office/drawing/2014/main" val="3969413928"/>
+                    </a:ext>
+                  </a:extLst>
+                </a:gridCol>
+                <a:gridCol w="3875603">
+                  <a:extLst>
+                    <a:ext uri="{9D8B030D-6E8A-4147-A177-3AD203B41FA5}">
+                      <a16:colId xmlns:a16="http://schemas.microsoft.com/office/drawing/2014/main" val="3747705379"/>
+                    </a:ext>
+                  </a:extLst>
+                </a:gridCol>
+                <a:gridCol w="2046802">
+                  <a:extLst>
+                    <a:ext uri="{9D8B030D-6E8A-4147-A177-3AD203B41FA5}">
+                      <a16:colId xmlns:a16="http://schemas.microsoft.com/office/drawing/2014/main" val="3648378356"/>
+                    </a:ext>
+                  </a:extLst>
+                </a:gridCol>
+              </a:tblGrid>
+              <a:tr h="1007377">
+                <a:tc>
+                  <a:txBody>
+                    <a:bodyPr/>
+                    <a:lstStyle/>
+                    <a:p>
+                      <a:pPr algn="l"/>
+                      <a:r>
+                        <a:rPr lang="de-AT" sz="2400" dirty="0">
+                          <a:solidFill>
+                            <a:schemeClr val="tx1"/>
+                          </a:solidFill>
+                        </a:rPr>
+                        <a:t>Model Variant</a:t>
+                      </a:r>
+                    </a:p>
+                  </a:txBody>
+                  <a:tcPr anchor="ctr"/>
+                </a:tc>
+                <a:tc>
+                  <a:txBody>
+                    <a:bodyPr/>
+                    <a:lstStyle/>
+                    <a:p>
+                      <a:pPr algn="l"/>
+                      <a:r>
+                        <a:rPr lang="de-AT" sz="2400" dirty="0" err="1">
+                          <a:solidFill>
+                            <a:schemeClr val="tx1"/>
+                          </a:solidFill>
+                        </a:rPr>
+                        <a:t>Perplexity</a:t>
+                      </a:r>
+                      <a:r>
+                        <a:rPr lang="de-AT" sz="2400" dirty="0">
+                          <a:solidFill>
+                            <a:schemeClr val="tx1"/>
+                          </a:solidFill>
+                        </a:rPr>
+                        <a:t> (</a:t>
+                      </a:r>
+                      <a:r>
+                        <a:rPr lang="de-AT" sz="2400" dirty="0" err="1">
+                          <a:solidFill>
+                            <a:schemeClr val="tx1"/>
+                          </a:solidFill>
+                        </a:rPr>
+                        <a:t>lower</a:t>
+                      </a:r>
+                      <a:r>
+                        <a:rPr lang="de-AT" sz="2400" dirty="0">
+                          <a:solidFill>
+                            <a:schemeClr val="tx1"/>
+                          </a:solidFill>
+                        </a:rPr>
+                        <a:t> </a:t>
+                      </a:r>
+                      <a:r>
+                        <a:rPr lang="de-AT" sz="2400" dirty="0" err="1">
+                          <a:solidFill>
+                            <a:schemeClr val="tx1"/>
+                          </a:solidFill>
+                        </a:rPr>
+                        <a:t>is</a:t>
+                      </a:r>
+                      <a:r>
+                        <a:rPr lang="de-AT" sz="2400" dirty="0">
+                          <a:solidFill>
+                            <a:schemeClr val="tx1"/>
+                          </a:solidFill>
+                        </a:rPr>
+                        <a:t> </a:t>
+                      </a:r>
+                      <a:r>
+                        <a:rPr lang="de-AT" sz="2400" dirty="0" err="1">
+                          <a:solidFill>
+                            <a:schemeClr val="tx1"/>
+                          </a:solidFill>
+                        </a:rPr>
+                        <a:t>better</a:t>
+                      </a:r>
+                      <a:r>
+                        <a:rPr lang="de-AT" sz="2400" dirty="0">
+                          <a:solidFill>
+                            <a:schemeClr val="tx1"/>
+                          </a:solidFill>
+                        </a:rPr>
+                        <a:t>)</a:t>
+                      </a:r>
+                    </a:p>
+                  </a:txBody>
+                  <a:tcPr anchor="ctr"/>
+                </a:tc>
+                <a:tc>
+                  <a:txBody>
+                    <a:bodyPr/>
+                    <a:lstStyle/>
+                    <a:p>
+                      <a:pPr algn="l"/>
+                      <a:endParaRPr lang="de-AT" sz="2400" dirty="0">
+                        <a:solidFill>
+                          <a:schemeClr val="tx1"/>
+                        </a:solidFill>
+                      </a:endParaRPr>
+                    </a:p>
+                  </a:txBody>
+                  <a:tcPr anchor="ctr"/>
+                </a:tc>
+                <a:extLst>
+                  <a:ext uri="{0D108BD9-81ED-4DB2-BD59-A6C34878D82A}">
+                    <a16:rowId xmlns:a16="http://schemas.microsoft.com/office/drawing/2014/main" val="229597958"/>
+                  </a:ext>
+                </a:extLst>
+              </a:tr>
+              <a:tr h="1007377">
+                <a:tc>
+                  <a:txBody>
+                    <a:bodyPr/>
+                    <a:lstStyle/>
+                    <a:p>
+                      <a:pPr algn="l"/>
+                      <a:r>
+                        <a:rPr lang="de-AT" sz="2400" dirty="0">
+                          <a:solidFill>
+                            <a:schemeClr val="tx1"/>
+                          </a:solidFill>
+                        </a:rPr>
+                        <a:t>Baseline (float32)</a:t>
+                      </a:r>
+                    </a:p>
+                  </a:txBody>
+                  <a:tcPr anchor="ctr"/>
+                </a:tc>
+                <a:tc>
+                  <a:txBody>
+                    <a:bodyPr/>
+                    <a:lstStyle/>
+                    <a:p>
+                      <a:pPr algn="l"/>
+                      <a:r>
+                        <a:rPr lang="de-AT" sz="2400" dirty="0">
+                          <a:solidFill>
+                            <a:schemeClr val="accent6">
+                              <a:lumMod val="75000"/>
+                            </a:schemeClr>
+                          </a:solidFill>
+                        </a:rPr>
+                        <a:t>2.76</a:t>
+                      </a:r>
+                    </a:p>
+                  </a:txBody>
+                  <a:tcPr anchor="ctr"/>
+                </a:tc>
+                <a:tc>
+                  <a:txBody>
+                    <a:bodyPr/>
+                    <a:lstStyle/>
+                    <a:p>
+                      <a:pPr algn="l"/>
+                      <a:endParaRPr lang="de-AT" sz="2400" dirty="0">
+                        <a:solidFill>
+                          <a:srgbClr val="C00000"/>
+                        </a:solidFill>
+                      </a:endParaRPr>
+                    </a:p>
+                  </a:txBody>
+                  <a:tcPr anchor="ctr"/>
+                </a:tc>
+                <a:extLst>
+                  <a:ext uri="{0D108BD9-81ED-4DB2-BD59-A6C34878D82A}">
+                    <a16:rowId xmlns:a16="http://schemas.microsoft.com/office/drawing/2014/main" val="3001397675"/>
+                  </a:ext>
+                </a:extLst>
+              </a:tr>
+              <a:tr h="1007377">
+                <a:tc>
+                  <a:txBody>
+                    <a:bodyPr/>
+                    <a:lstStyle/>
+                    <a:p>
+                      <a:pPr algn="l"/>
+                      <a:r>
+                        <a:rPr lang="de-AT" sz="2400" dirty="0">
+                          <a:solidFill>
+                            <a:schemeClr val="tx1"/>
+                          </a:solidFill>
+                        </a:rPr>
+                        <a:t>Naive </a:t>
+                      </a:r>
+                      <a:r>
+                        <a:rPr lang="de-AT" sz="2400" dirty="0" err="1">
+                          <a:solidFill>
+                            <a:schemeClr val="tx1"/>
+                          </a:solidFill>
+                        </a:rPr>
+                        <a:t>Quantization</a:t>
+                      </a:r>
+                      <a:r>
+                        <a:rPr lang="de-AT" sz="2400" dirty="0">
+                          <a:solidFill>
+                            <a:schemeClr val="tx1"/>
+                          </a:solidFill>
+                        </a:rPr>
+                        <a:t> (int8)</a:t>
+                      </a:r>
+                    </a:p>
+                  </a:txBody>
+                  <a:tcPr anchor="ctr"/>
+                </a:tc>
+                <a:tc>
+                  <a:txBody>
+                    <a:bodyPr/>
+                    <a:lstStyle/>
+                    <a:p>
+                      <a:pPr algn="l"/>
+                      <a:r>
+                        <a:rPr lang="de-AT" sz="2400" dirty="0">
+                          <a:solidFill>
+                            <a:srgbClr val="C00000"/>
+                          </a:solidFill>
+                        </a:rPr>
+                        <a:t>2.78</a:t>
+                      </a:r>
+                    </a:p>
+                  </a:txBody>
+                  <a:tcPr anchor="ctr"/>
+                </a:tc>
+                <a:tc>
+                  <a:txBody>
+                    <a:bodyPr/>
+                    <a:lstStyle/>
+                    <a:p>
+                      <a:pPr algn="l"/>
+                      <a:endParaRPr lang="de-AT" sz="2400" dirty="0">
+                        <a:solidFill>
+                          <a:schemeClr val="accent6">
+                            <a:lumMod val="75000"/>
+                          </a:schemeClr>
+                        </a:solidFill>
+                      </a:endParaRPr>
+                    </a:p>
+                  </a:txBody>
+                  <a:tcPr anchor="ctr"/>
+                </a:tc>
+                <a:extLst>
+                  <a:ext uri="{0D108BD9-81ED-4DB2-BD59-A6C34878D82A}">
+                    <a16:rowId xmlns:a16="http://schemas.microsoft.com/office/drawing/2014/main" val="1022930641"/>
+                  </a:ext>
+                </a:extLst>
+              </a:tr>
+              <a:tr h="1007377">
+                <a:tc>
+                  <a:txBody>
+                    <a:bodyPr/>
+                    <a:lstStyle/>
+                    <a:p>
+                      <a:pPr algn="l"/>
+                      <a:r>
+                        <a:rPr lang="de-AT" sz="2400" dirty="0">
+                          <a:solidFill>
+                            <a:schemeClr val="tx1"/>
+                          </a:solidFill>
+                        </a:rPr>
+                        <a:t>GPTQ (int8)</a:t>
+                      </a:r>
+                    </a:p>
+                  </a:txBody>
+                  <a:tcPr anchor="ctr"/>
+                </a:tc>
+                <a:tc>
+                  <a:txBody>
+                    <a:bodyPr/>
+                    <a:lstStyle/>
+                    <a:p>
+                      <a:pPr algn="l"/>
+                      <a:r>
+                        <a:rPr lang="de-AT" sz="2400" dirty="0">
+                          <a:solidFill>
+                            <a:schemeClr val="accent6">
+                              <a:lumMod val="75000"/>
+                            </a:schemeClr>
+                          </a:solidFill>
+                        </a:rPr>
+                        <a:t>2.76</a:t>
+                      </a:r>
+                    </a:p>
+                  </a:txBody>
+                  <a:tcPr anchor="ctr"/>
+                </a:tc>
+                <a:tc>
+                  <a:txBody>
+                    <a:bodyPr/>
+                    <a:lstStyle/>
+                    <a:p>
+                      <a:pPr algn="l"/>
+                      <a:endParaRPr lang="de-AT" sz="2400" dirty="0">
+                        <a:solidFill>
+                          <a:schemeClr val="accent6">
+                            <a:lumMod val="75000"/>
+                          </a:schemeClr>
+                        </a:solidFill>
+                      </a:endParaRPr>
+                    </a:p>
+                  </a:txBody>
+                  <a:tcPr anchor="ctr"/>
+                </a:tc>
+                <a:extLst>
+                  <a:ext uri="{0D108BD9-81ED-4DB2-BD59-A6C34878D82A}">
+                    <a16:rowId xmlns:a16="http://schemas.microsoft.com/office/drawing/2014/main" val="2095179141"/>
+                  </a:ext>
+                </a:extLst>
+              </a:tr>
+            </a:tbl>
+          </a:graphicData>
+        </a:graphic>
+      </p:graphicFrame>
     </p:spTree>
     <p:extLst>
       <p:ext uri="{BB962C8B-B14F-4D97-AF65-F5344CB8AC3E}">
         <p14:creationId xmlns:p14="http://schemas.microsoft.com/office/powerpoint/2010/main" val="4009078783"/>
+      </p:ext>
+    </p:extLst>
+  </p:cSld>
+  <p:clrMapOvr>
+    <a:masterClrMapping/>
+  </p:clrMapOvr>
+</p:sld>
+</file>
+
+<file path=ppt/slides/slide9.xml><?xml version="1.0" encoding="utf-8"?>
+<p:sld xmlns:a="http://schemas.openxmlformats.org/drawingml/2006/main" xmlns:r="http://schemas.openxmlformats.org/officeDocument/2006/relationships" xmlns:p="http://schemas.openxmlformats.org/presentationml/2006/main">
+  <p:cSld>
+    <p:spTree>
+      <p:nvGrpSpPr>
+        <p:cNvPr id="1" name="">
+          <a:extLst>
+            <a:ext uri="{FF2B5EF4-FFF2-40B4-BE49-F238E27FC236}">
+              <a16:creationId xmlns:a16="http://schemas.microsoft.com/office/drawing/2014/main" id="{59FD9846-BDA0-98D3-2271-772D57BD7AA1}"/>
+            </a:ext>
+          </a:extLst>
+        </p:cNvPr>
+        <p:cNvGrpSpPr/>
+        <p:nvPr/>
+      </p:nvGrpSpPr>
+      <p:grpSpPr>
+        <a:xfrm>
+          <a:off x="0" y="0"/>
+          <a:ext cx="0" cy="0"/>
+          <a:chOff x="0" y="0"/>
+          <a:chExt cx="0" cy="0"/>
+        </a:xfrm>
+      </p:grpSpPr>
+      <p:sp>
+        <p:nvSpPr>
+          <p:cNvPr id="16" name="Titel 1">
+            <a:extLst>
+              <a:ext uri="{FF2B5EF4-FFF2-40B4-BE49-F238E27FC236}">
+                <a16:creationId xmlns:a16="http://schemas.microsoft.com/office/drawing/2014/main" id="{C613510E-925B-8532-8B02-A525CBA5E93D}"/>
+              </a:ext>
+            </a:extLst>
+          </p:cNvPr>
+          <p:cNvSpPr>
+            <a:spLocks noGrp="1"/>
+          </p:cNvSpPr>
+          <p:nvPr>
+            <p:ph type="title"/>
+          </p:nvPr>
+        </p:nvSpPr>
+        <p:spPr>
+          <a:xfrm>
+            <a:off x="2699083" y="352103"/>
+            <a:ext cx="6878217" cy="653321"/>
+          </a:xfrm>
+        </p:spPr>
+        <p:txBody>
+          <a:bodyPr rtlCol="0" anchor="b">
+            <a:noAutofit/>
+          </a:bodyPr>
+          <a:lstStyle>
+            <a:defPPr>
+              <a:defRPr lang="de-DE"/>
+            </a:defPPr>
+          </a:lstStyle>
+          <a:p>
+            <a:pPr rtl="0"/>
+            <a:r>
+              <a:rPr lang="de-DE" dirty="0" err="1"/>
+              <a:t>Results</a:t>
+            </a:r>
+            <a:endParaRPr lang="de-DE" dirty="0"/>
+          </a:p>
+        </p:txBody>
+      </p:sp>
+      <p:graphicFrame>
+        <p:nvGraphicFramePr>
+          <p:cNvPr id="6" name="Tabelle 5">
+            <a:extLst>
+              <a:ext uri="{FF2B5EF4-FFF2-40B4-BE49-F238E27FC236}">
+                <a16:creationId xmlns:a16="http://schemas.microsoft.com/office/drawing/2014/main" id="{03E991BE-AC5C-71E3-3848-F8F3315293ED}"/>
+              </a:ext>
+            </a:extLst>
+          </p:cNvPr>
+          <p:cNvGraphicFramePr>
+            <a:graphicFrameLocks noGrp="1"/>
+          </p:cNvGraphicFramePr>
+          <p:nvPr>
+            <p:extLst>
+              <p:ext uri="{D42A27DB-BD31-4B8C-83A1-F6EECF244321}">
+                <p14:modId xmlns:p14="http://schemas.microsoft.com/office/powerpoint/2010/main" val="3200756073"/>
+              </p:ext>
+            </p:extLst>
+          </p:nvPr>
+        </p:nvGraphicFramePr>
+        <p:xfrm>
+          <a:off x="2107359" y="1529560"/>
+          <a:ext cx="9658728" cy="4029508"/>
+        </p:xfrm>
+        <a:graphic>
+          <a:graphicData uri="http://schemas.openxmlformats.org/drawingml/2006/table">
+            <a:tbl>
+              <a:tblPr firstRow="1" bandRow="1">
+                <a:tableStyleId>{5C22544A-7EE6-4342-B048-85BDC9FD1C3A}</a:tableStyleId>
+              </a:tblPr>
+              <a:tblGrid>
+                <a:gridCol w="3736323">
+                  <a:extLst>
+                    <a:ext uri="{9D8B030D-6E8A-4147-A177-3AD203B41FA5}">
+                      <a16:colId xmlns:a16="http://schemas.microsoft.com/office/drawing/2014/main" val="3969413928"/>
+                    </a:ext>
+                  </a:extLst>
+                </a:gridCol>
+                <a:gridCol w="3875603">
+                  <a:extLst>
+                    <a:ext uri="{9D8B030D-6E8A-4147-A177-3AD203B41FA5}">
+                      <a16:colId xmlns:a16="http://schemas.microsoft.com/office/drawing/2014/main" val="3747705379"/>
+                    </a:ext>
+                  </a:extLst>
+                </a:gridCol>
+                <a:gridCol w="2046802">
+                  <a:extLst>
+                    <a:ext uri="{9D8B030D-6E8A-4147-A177-3AD203B41FA5}">
+                      <a16:colId xmlns:a16="http://schemas.microsoft.com/office/drawing/2014/main" val="3648378356"/>
+                    </a:ext>
+                  </a:extLst>
+                </a:gridCol>
+              </a:tblGrid>
+              <a:tr h="1007377">
+                <a:tc>
+                  <a:txBody>
+                    <a:bodyPr/>
+                    <a:lstStyle/>
+                    <a:p>
+                      <a:pPr algn="l"/>
+                      <a:r>
+                        <a:rPr lang="de-AT" sz="2400" dirty="0">
+                          <a:solidFill>
+                            <a:schemeClr val="tx1"/>
+                          </a:solidFill>
+                        </a:rPr>
+                        <a:t>Model Variant</a:t>
+                      </a:r>
+                    </a:p>
+                  </a:txBody>
+                  <a:tcPr anchor="ctr"/>
+                </a:tc>
+                <a:tc>
+                  <a:txBody>
+                    <a:bodyPr/>
+                    <a:lstStyle/>
+                    <a:p>
+                      <a:pPr algn="l"/>
+                      <a:r>
+                        <a:rPr lang="de-AT" sz="2400" dirty="0" err="1">
+                          <a:solidFill>
+                            <a:schemeClr val="tx1"/>
+                          </a:solidFill>
+                        </a:rPr>
+                        <a:t>Perplexity</a:t>
+                      </a:r>
+                      <a:r>
+                        <a:rPr lang="de-AT" sz="2400" dirty="0">
+                          <a:solidFill>
+                            <a:schemeClr val="tx1"/>
+                          </a:solidFill>
+                        </a:rPr>
+                        <a:t> (</a:t>
+                      </a:r>
+                      <a:r>
+                        <a:rPr lang="de-AT" sz="2400" dirty="0" err="1">
+                          <a:solidFill>
+                            <a:schemeClr val="tx1"/>
+                          </a:solidFill>
+                        </a:rPr>
+                        <a:t>lower</a:t>
+                      </a:r>
+                      <a:r>
+                        <a:rPr lang="de-AT" sz="2400" dirty="0">
+                          <a:solidFill>
+                            <a:schemeClr val="tx1"/>
+                          </a:solidFill>
+                        </a:rPr>
+                        <a:t> </a:t>
+                      </a:r>
+                      <a:r>
+                        <a:rPr lang="de-AT" sz="2400" dirty="0" err="1">
+                          <a:solidFill>
+                            <a:schemeClr val="tx1"/>
+                          </a:solidFill>
+                        </a:rPr>
+                        <a:t>is</a:t>
+                      </a:r>
+                      <a:r>
+                        <a:rPr lang="de-AT" sz="2400" dirty="0">
+                          <a:solidFill>
+                            <a:schemeClr val="tx1"/>
+                          </a:solidFill>
+                        </a:rPr>
+                        <a:t> </a:t>
+                      </a:r>
+                      <a:r>
+                        <a:rPr lang="de-AT" sz="2400" dirty="0" err="1">
+                          <a:solidFill>
+                            <a:schemeClr val="tx1"/>
+                          </a:solidFill>
+                        </a:rPr>
+                        <a:t>better</a:t>
+                      </a:r>
+                      <a:r>
+                        <a:rPr lang="de-AT" sz="2400" dirty="0">
+                          <a:solidFill>
+                            <a:schemeClr val="tx1"/>
+                          </a:solidFill>
+                        </a:rPr>
+                        <a:t>)</a:t>
+                      </a:r>
+                    </a:p>
+                  </a:txBody>
+                  <a:tcPr anchor="ctr"/>
+                </a:tc>
+                <a:tc>
+                  <a:txBody>
+                    <a:bodyPr/>
+                    <a:lstStyle/>
+                    <a:p>
+                      <a:pPr algn="l"/>
+                      <a:r>
+                        <a:rPr lang="de-AT" sz="2400" dirty="0">
+                          <a:solidFill>
+                            <a:schemeClr val="tx1"/>
+                          </a:solidFill>
+                        </a:rPr>
+                        <a:t>Model </a:t>
+                      </a:r>
+                      <a:r>
+                        <a:rPr lang="de-AT" sz="2400" dirty="0" err="1">
+                          <a:solidFill>
+                            <a:schemeClr val="tx1"/>
+                          </a:solidFill>
+                        </a:rPr>
+                        <a:t>size</a:t>
+                      </a:r>
+                      <a:r>
+                        <a:rPr lang="de-AT" sz="2400" dirty="0">
+                          <a:solidFill>
+                            <a:schemeClr val="tx1"/>
+                          </a:solidFill>
+                        </a:rPr>
+                        <a:t> </a:t>
+                      </a:r>
+                    </a:p>
+                  </a:txBody>
+                  <a:tcPr anchor="ctr"/>
+                </a:tc>
+                <a:extLst>
+                  <a:ext uri="{0D108BD9-81ED-4DB2-BD59-A6C34878D82A}">
+                    <a16:rowId xmlns:a16="http://schemas.microsoft.com/office/drawing/2014/main" val="229597958"/>
+                  </a:ext>
+                </a:extLst>
+              </a:tr>
+              <a:tr h="1007377">
+                <a:tc>
+                  <a:txBody>
+                    <a:bodyPr/>
+                    <a:lstStyle/>
+                    <a:p>
+                      <a:pPr algn="l"/>
+                      <a:r>
+                        <a:rPr lang="de-AT" sz="2400" dirty="0">
+                          <a:solidFill>
+                            <a:schemeClr val="tx1"/>
+                          </a:solidFill>
+                        </a:rPr>
+                        <a:t>Baseline (float32)</a:t>
+                      </a:r>
+                    </a:p>
+                  </a:txBody>
+                  <a:tcPr anchor="ctr"/>
+                </a:tc>
+                <a:tc>
+                  <a:txBody>
+                    <a:bodyPr/>
+                    <a:lstStyle/>
+                    <a:p>
+                      <a:pPr algn="l"/>
+                      <a:r>
+                        <a:rPr lang="de-AT" sz="2400" dirty="0">
+                          <a:solidFill>
+                            <a:schemeClr val="accent6">
+                              <a:lumMod val="75000"/>
+                            </a:schemeClr>
+                          </a:solidFill>
+                        </a:rPr>
+                        <a:t>2.76</a:t>
+                      </a:r>
+                    </a:p>
+                  </a:txBody>
+                  <a:tcPr anchor="ctr"/>
+                </a:tc>
+                <a:tc>
+                  <a:txBody>
+                    <a:bodyPr/>
+                    <a:lstStyle/>
+                    <a:p>
+                      <a:pPr algn="l"/>
+                      <a:r>
+                        <a:rPr lang="de-AT" sz="2400" dirty="0">
+                          <a:solidFill>
+                            <a:srgbClr val="C00000"/>
+                          </a:solidFill>
+                        </a:rPr>
+                        <a:t>31.9 MB</a:t>
+                      </a:r>
+                    </a:p>
+                  </a:txBody>
+                  <a:tcPr anchor="ctr"/>
+                </a:tc>
+                <a:extLst>
+                  <a:ext uri="{0D108BD9-81ED-4DB2-BD59-A6C34878D82A}">
+                    <a16:rowId xmlns:a16="http://schemas.microsoft.com/office/drawing/2014/main" val="3001397675"/>
+                  </a:ext>
+                </a:extLst>
+              </a:tr>
+              <a:tr h="1007377">
+                <a:tc>
+                  <a:txBody>
+                    <a:bodyPr/>
+                    <a:lstStyle/>
+                    <a:p>
+                      <a:pPr algn="l"/>
+                      <a:r>
+                        <a:rPr lang="de-AT" sz="2400" dirty="0">
+                          <a:solidFill>
+                            <a:schemeClr val="tx1"/>
+                          </a:solidFill>
+                        </a:rPr>
+                        <a:t>Naive </a:t>
+                      </a:r>
+                      <a:r>
+                        <a:rPr lang="de-AT" sz="2400" dirty="0" err="1">
+                          <a:solidFill>
+                            <a:schemeClr val="tx1"/>
+                          </a:solidFill>
+                        </a:rPr>
+                        <a:t>Quantization</a:t>
+                      </a:r>
+                      <a:r>
+                        <a:rPr lang="de-AT" sz="2400" dirty="0">
+                          <a:solidFill>
+                            <a:schemeClr val="tx1"/>
+                          </a:solidFill>
+                        </a:rPr>
+                        <a:t> (int8)</a:t>
+                      </a:r>
+                    </a:p>
+                  </a:txBody>
+                  <a:tcPr anchor="ctr"/>
+                </a:tc>
+                <a:tc>
+                  <a:txBody>
+                    <a:bodyPr/>
+                    <a:lstStyle/>
+                    <a:p>
+                      <a:pPr algn="l"/>
+                      <a:r>
+                        <a:rPr lang="de-AT" sz="2400" dirty="0">
+                          <a:solidFill>
+                            <a:srgbClr val="C00000"/>
+                          </a:solidFill>
+                        </a:rPr>
+                        <a:t>2.78</a:t>
+                      </a:r>
+                    </a:p>
+                  </a:txBody>
+                  <a:tcPr anchor="ctr"/>
+                </a:tc>
+                <a:tc>
+                  <a:txBody>
+                    <a:bodyPr/>
+                    <a:lstStyle/>
+                    <a:p>
+                      <a:pPr algn="l"/>
+                      <a:r>
+                        <a:rPr lang="de-AT" sz="2400" dirty="0">
+                          <a:solidFill>
+                            <a:schemeClr val="accent6">
+                              <a:lumMod val="75000"/>
+                            </a:schemeClr>
+                          </a:solidFill>
+                        </a:rPr>
+                        <a:t>2.9 MB</a:t>
+                      </a:r>
+                    </a:p>
+                  </a:txBody>
+                  <a:tcPr anchor="ctr"/>
+                </a:tc>
+                <a:extLst>
+                  <a:ext uri="{0D108BD9-81ED-4DB2-BD59-A6C34878D82A}">
+                    <a16:rowId xmlns:a16="http://schemas.microsoft.com/office/drawing/2014/main" val="1022930641"/>
+                  </a:ext>
+                </a:extLst>
+              </a:tr>
+              <a:tr h="1007377">
+                <a:tc>
+                  <a:txBody>
+                    <a:bodyPr/>
+                    <a:lstStyle/>
+                    <a:p>
+                      <a:pPr algn="l"/>
+                      <a:r>
+                        <a:rPr lang="de-AT" sz="2400" dirty="0">
+                          <a:solidFill>
+                            <a:schemeClr val="tx1"/>
+                          </a:solidFill>
+                        </a:rPr>
+                        <a:t>GPTQ (int8)</a:t>
+                      </a:r>
+                    </a:p>
+                  </a:txBody>
+                  <a:tcPr anchor="ctr"/>
+                </a:tc>
+                <a:tc>
+                  <a:txBody>
+                    <a:bodyPr/>
+                    <a:lstStyle/>
+                    <a:p>
+                      <a:pPr algn="l"/>
+                      <a:r>
+                        <a:rPr lang="de-AT" sz="2400" dirty="0">
+                          <a:solidFill>
+                            <a:schemeClr val="accent6">
+                              <a:lumMod val="75000"/>
+                            </a:schemeClr>
+                          </a:solidFill>
+                        </a:rPr>
+                        <a:t>2.76</a:t>
+                      </a:r>
+                    </a:p>
+                  </a:txBody>
+                  <a:tcPr anchor="ctr"/>
+                </a:tc>
+                <a:tc>
+                  <a:txBody>
+                    <a:bodyPr/>
+                    <a:lstStyle/>
+                    <a:p>
+                      <a:pPr algn="l"/>
+                      <a:r>
+                        <a:rPr lang="de-AT" sz="2400" dirty="0">
+                          <a:solidFill>
+                            <a:schemeClr val="accent6">
+                              <a:lumMod val="75000"/>
+                            </a:schemeClr>
+                          </a:solidFill>
+                        </a:rPr>
+                        <a:t>2.9 MB</a:t>
+                      </a:r>
+                    </a:p>
+                  </a:txBody>
+                  <a:tcPr anchor="ctr"/>
+                </a:tc>
+                <a:extLst>
+                  <a:ext uri="{0D108BD9-81ED-4DB2-BD59-A6C34878D82A}">
+                    <a16:rowId xmlns:a16="http://schemas.microsoft.com/office/drawing/2014/main" val="2095179141"/>
+                  </a:ext>
+                </a:extLst>
+              </a:tr>
+            </a:tbl>
+          </a:graphicData>
+        </a:graphic>
+      </p:graphicFrame>
+      <p:sp>
+        <p:nvSpPr>
+          <p:cNvPr id="3" name="PB">
+            <a:extLst>
+              <a:ext uri="{FF2B5EF4-FFF2-40B4-BE49-F238E27FC236}">
+                <a16:creationId xmlns:a16="http://schemas.microsoft.com/office/drawing/2014/main" id="{8E0D94B2-6F55-2E67-62B3-E7444FEC8F71}"/>
+              </a:ext>
+            </a:extLst>
+          </p:cNvPr>
+          <p:cNvSpPr/>
+          <p:nvPr/>
+        </p:nvSpPr>
+        <p:spPr>
+          <a:xfrm>
+            <a:off x="0" y="6756400"/>
+            <a:ext cx="8708572" cy="101600"/>
+          </a:xfrm>
+          <a:prstGeom prst="rect">
+            <a:avLst/>
+          </a:prstGeom>
+          <a:solidFill>
+            <a:srgbClr val="000000"/>
+          </a:solidFill>
+        </p:spPr>
+        <p:style>
+          <a:lnRef idx="2">
+            <a:schemeClr val="accent1">
+              <a:shade val="15000"/>
+            </a:schemeClr>
+          </a:lnRef>
+          <a:fillRef idx="1">
+            <a:schemeClr val="accent1"/>
+          </a:fillRef>
+          <a:effectRef idx="0">
+            <a:schemeClr val="accent1"/>
+          </a:effectRef>
+          <a:fontRef idx="minor">
+            <a:schemeClr val="lt1"/>
+          </a:fontRef>
+        </p:style>
+        <p:txBody>
+          <a:bodyPr rtlCol="0" anchor="ctr"/>
+          <a:lstStyle/>
+          <a:p>
+            <a:pPr algn="ctr"/>
+            <a:endParaRPr lang="de-AT"/>
+          </a:p>
+        </p:txBody>
+      </p:sp>
+    </p:spTree>
+    <p:extLst>
+      <p:ext uri="{BB962C8B-B14F-4D97-AF65-F5344CB8AC3E}">
+        <p14:creationId xmlns:p14="http://schemas.microsoft.com/office/powerpoint/2010/main" val="3751214146"/>
       </p:ext>
     </p:extLst>
   </p:cSld>
@@ -14659,15 +14512,6 @@
 </file>
 
 <file path=customXml/item1.xml><?xml version="1.0" encoding="utf-8"?>
-<?mso-contentType ?>
-<FormTemplates xmlns="http://schemas.microsoft.com/sharepoint/v3/contenttype/forms">
-  <Display>DocumentLibraryForm</Display>
-  <Edit>DocumentLibraryForm</Edit>
-  <New>DocumentLibraryForm</New>
-</FormTemplates>
-</file>
-
-<file path=customXml/item2.xml><?xml version="1.0" encoding="utf-8"?>
 <p:properties xmlns:p="http://schemas.microsoft.com/office/2006/metadata/properties" xmlns:xsi="http://www.w3.org/2001/XMLSchema-instance" xmlns:pc="http://schemas.microsoft.com/office/infopath/2007/PartnerControls">
   <documentManagement>
     <_ip_UnifiedCompliancePolicyUIAction xmlns="http://schemas.microsoft.com/sharepoint/v3" xsi:nil="true"/>
@@ -14685,6 +14529,15 @@
     <MediaServiceKeyPoints xmlns="71af3243-3dd4-4a8d-8c0d-dd76da1f02a5" xsi:nil="true"/>
   </documentManagement>
 </p:properties>
+</file>
+
+<file path=customXml/item2.xml><?xml version="1.0" encoding="utf-8"?>
+<?mso-contentType ?>
+<FormTemplates xmlns="http://schemas.microsoft.com/sharepoint/v3/contenttype/forms">
+  <Display>DocumentLibraryForm</Display>
+  <Edit>DocumentLibraryForm</Edit>
+  <New>DocumentLibraryForm</New>
+</FormTemplates>
 </file>
 
 <file path=customXml/item3.xml><?xml version="1.0" encoding="utf-8"?>
@@ -15000,14 +14853,6 @@
 </file>
 
 <file path=customXml/itemProps1.xml><?xml version="1.0" encoding="utf-8"?>
-<ds:datastoreItem xmlns:ds="http://schemas.openxmlformats.org/officeDocument/2006/customXml" ds:itemID="{CABF691C-888B-4061-8A6F-D5CE84A0254B}">
-  <ds:schemaRefs>
-    <ds:schemaRef ds:uri="http://schemas.microsoft.com/sharepoint/v3/contenttype/forms"/>
-  </ds:schemaRefs>
-</ds:datastoreItem>
-</file>
-
-<file path=customXml/itemProps2.xml><?xml version="1.0" encoding="utf-8"?>
 <ds:datastoreItem xmlns:ds="http://schemas.openxmlformats.org/officeDocument/2006/customXml" ds:itemID="{49168DCE-134F-4610-A6AA-88CEBE8D71D2}">
   <ds:schemaRefs>
     <ds:schemaRef ds:uri="http://purl.org/dc/dcmitype/"/>
@@ -15022,6 +14867,14 @@
     <ds:schemaRef ds:uri="http://schemas.openxmlformats.org/package/2006/metadata/core-properties"/>
     <ds:schemaRef ds:uri="16c05727-aa75-4e4a-9b5f-8a80a1165891"/>
     <ds:schemaRef ds:uri="http://schemas.microsoft.com/sharepoint/v3"/>
+  </ds:schemaRefs>
+</ds:datastoreItem>
+</file>
+
+<file path=customXml/itemProps2.xml><?xml version="1.0" encoding="utf-8"?>
+<ds:datastoreItem xmlns:ds="http://schemas.openxmlformats.org/officeDocument/2006/customXml" ds:itemID="{CABF691C-888B-4061-8A6F-D5CE84A0254B}">
+  <ds:schemaRefs>
+    <ds:schemaRef ds:uri="http://schemas.microsoft.com/sharepoint/v3/contenttype/forms"/>
   </ds:schemaRefs>
 </ds:datastoreItem>
 </file>

</xml_diff>